<commit_message>
Updated presentation to remove code segment
</commit_message>
<xml_diff>
--- a/documentation/slides/PresentationFeb7.pptx
+++ b/documentation/slides/PresentationFeb7.pptx
@@ -19,24 +19,23 @@
     <p:sldId id="264" r:id="rId13"/>
     <p:sldId id="265" r:id="rId14"/>
     <p:sldId id="266" r:id="rId15"/>
-    <p:sldId id="267" r:id="rId16"/>
   </p:sldIdLst>
   <p:sldSz cy="5143500" cx="9144000"/>
   <p:notesSz cx="6858000" cy="9144000"/>
   <p:embeddedFontLst>
     <p:embeddedFont>
       <p:font typeface="Montserrat"/>
-      <p:regular r:id="rId17"/>
-      <p:bold r:id="rId18"/>
-      <p:italic r:id="rId19"/>
-      <p:boldItalic r:id="rId20"/>
+      <p:regular r:id="rId16"/>
+      <p:bold r:id="rId17"/>
+      <p:italic r:id="rId18"/>
+      <p:boldItalic r:id="rId19"/>
     </p:embeddedFont>
     <p:embeddedFont>
       <p:font typeface="Lato"/>
-      <p:regular r:id="rId21"/>
-      <p:bold r:id="rId22"/>
-      <p:italic r:id="rId23"/>
-      <p:boldItalic r:id="rId24"/>
+      <p:regular r:id="rId20"/>
+      <p:bold r:id="rId21"/>
+      <p:italic r:id="rId22"/>
+      <p:boldItalic r:id="rId23"/>
     </p:embeddedFont>
   </p:embeddedFontLst>
   <p:defaultTextStyle>
@@ -800,7 +799,7 @@
   <p:cSld>
     <p:spTree>
       <p:nvGrpSpPr>
-        <p:cNvPr id="191" name="Shape 191"/>
+        <p:cNvPr id="192" name="Shape 192"/>
         <p:cNvGrpSpPr/>
         <p:nvPr/>
       </p:nvGrpSpPr>
@@ -814,7 +813,7 @@
       </p:grpSpPr>
       <p:sp>
         <p:nvSpPr>
-          <p:cNvPr id="192" name="Google Shape;192;g4ebcf7c756_0_8:notes"/>
+          <p:cNvPr id="193" name="Google Shape;193;g4f497c7c11_0_0:notes"/>
           <p:cNvSpPr/>
           <p:nvPr>
             <p:ph idx="2" type="sldImg"/>
@@ -849,7 +848,7 @@
       </p:sp>
       <p:sp>
         <p:nvSpPr>
-          <p:cNvPr id="193" name="Google Shape;193;g4ebcf7c756_0_8:notes"/>
+          <p:cNvPr id="194" name="Google Shape;194;g4f497c7c11_0_0:notes"/>
           <p:cNvSpPr txBox="1"/>
           <p:nvPr>
             <p:ph idx="1" type="body"/>
@@ -899,7 +898,7 @@
   <p:cSld>
     <p:spTree>
       <p:nvGrpSpPr>
-        <p:cNvPr id="199" name="Shape 199"/>
+        <p:cNvPr id="198" name="Shape 198"/>
         <p:cNvGrpSpPr/>
         <p:nvPr/>
       </p:nvGrpSpPr>
@@ -913,7 +912,7 @@
       </p:grpSpPr>
       <p:sp>
         <p:nvSpPr>
-          <p:cNvPr id="200" name="Google Shape;200;g4f497c7c11_0_0:notes"/>
+          <p:cNvPr id="199" name="Google Shape;199;g4e69c96881_0_25:notes"/>
           <p:cNvSpPr/>
           <p:nvPr>
             <p:ph idx="2" type="sldImg"/>
@@ -948,106 +947,7 @@
       </p:sp>
       <p:sp>
         <p:nvSpPr>
-          <p:cNvPr id="201" name="Google Shape;201;g4f497c7c11_0_0:notes"/>
-          <p:cNvSpPr txBox="1"/>
-          <p:nvPr>
-            <p:ph idx="1" type="body"/>
-          </p:nvPr>
-        </p:nvSpPr>
-        <p:spPr>
-          <a:xfrm>
-            <a:off x="685800" y="4343400"/>
-            <a:ext cx="5486400" cy="4114800"/>
-          </a:xfrm>
-          <a:prstGeom prst="rect">
-            <a:avLst/>
-          </a:prstGeom>
-        </p:spPr>
-        <p:txBody>
-          <a:bodyPr anchorCtr="0" anchor="t" bIns="91425" lIns="91425" spcFirstLastPara="1" rIns="91425" wrap="square" tIns="91425">
-            <a:noAutofit/>
-          </a:bodyPr>
-          <a:lstStyle/>
-          <a:p>
-            <a:pPr indent="0" lvl="0" marL="0" rtl="0" algn="l">
-              <a:spcBef>
-                <a:spcPts val="0"/>
-              </a:spcBef>
-              <a:spcAft>
-                <a:spcPts val="0"/>
-              </a:spcAft>
-              <a:buNone/>
-            </a:pPr>
-            <a:r>
-              <a:t/>
-            </a:r>
-            <a:endParaRPr/>
-          </a:p>
-        </p:txBody>
-      </p:sp>
-    </p:spTree>
-  </p:cSld>
-  <p:clrMapOvr>
-    <a:masterClrMapping/>
-  </p:clrMapOvr>
-</p:notes>
-</file>
-
-<file path=ppt/notesSlides/notesSlide12.xml><?xml version="1.0" encoding="utf-8"?>
-<p:notes xmlns:a="http://schemas.openxmlformats.org/drawingml/2006/main" xmlns:r="http://schemas.openxmlformats.org/officeDocument/2006/relationships" xmlns:mc="http://schemas.openxmlformats.org/markup-compatibility/2006" xmlns:mv="urn:schemas-microsoft-com:mac:vml" xmlns:p="http://schemas.openxmlformats.org/presentationml/2006/main" xmlns:c="http://schemas.openxmlformats.org/drawingml/2006/chart" xmlns:dgm="http://schemas.openxmlformats.org/drawingml/2006/diagram" xmlns:o="urn:schemas-microsoft-com:office:office" xmlns:v="urn:schemas-microsoft-com:vml" xmlns:pvml="urn:schemas-microsoft-com:office:powerpoint" xmlns:com="http://schemas.openxmlformats.org/drawingml/2006/compatibility" xmlns:p14="http://schemas.microsoft.com/office/powerpoint/2010/main" xmlns:p15="http://schemas.microsoft.com/office/powerpoint/2012/main" showMasterPhAnim="0" showMasterSp="0">
-  <p:cSld>
-    <p:spTree>
-      <p:nvGrpSpPr>
-        <p:cNvPr id="205" name="Shape 205"/>
-        <p:cNvGrpSpPr/>
-        <p:nvPr/>
-      </p:nvGrpSpPr>
-      <p:grpSpPr>
-        <a:xfrm>
-          <a:off x="0" y="0"/>
-          <a:ext cx="0" cy="0"/>
-          <a:chOff x="0" y="0"/>
-          <a:chExt cx="0" cy="0"/>
-        </a:xfrm>
-      </p:grpSpPr>
-      <p:sp>
-        <p:nvSpPr>
-          <p:cNvPr id="206" name="Google Shape;206;g4e69c96881_0_25:notes"/>
-          <p:cNvSpPr/>
-          <p:nvPr>
-            <p:ph idx="2" type="sldImg"/>
-          </p:nvPr>
-        </p:nvSpPr>
-        <p:spPr>
-          <a:xfrm>
-            <a:off x="381300" y="685800"/>
-            <a:ext cx="6096000" cy="3429000"/>
-          </a:xfrm>
-          <a:custGeom>
-            <a:rect b="b" l="l" r="r" t="t"/>
-            <a:pathLst>
-              <a:path extrusionOk="0" h="120000" w="120000">
-                <a:moveTo>
-                  <a:pt x="0" y="0"/>
-                </a:moveTo>
-                <a:lnTo>
-                  <a:pt x="120000" y="0"/>
-                </a:lnTo>
-                <a:lnTo>
-                  <a:pt x="120000" y="120000"/>
-                </a:lnTo>
-                <a:lnTo>
-                  <a:pt x="0" y="120000"/>
-                </a:lnTo>
-                <a:close/>
-              </a:path>
-            </a:pathLst>
-          </a:custGeom>
-        </p:spPr>
-      </p:sp>
-      <p:sp>
-        <p:nvSpPr>
-          <p:cNvPr id="207" name="Google Shape;207;g4e69c96881_0_25:notes"/>
+          <p:cNvPr id="200" name="Google Shape;200;g4e69c96881_0_25:notes"/>
           <p:cNvSpPr txBox="1"/>
           <p:nvPr>
             <p:ph idx="1" type="body"/>
@@ -1709,7 +1609,7 @@
       </p:grpSpPr>
       <p:sp>
         <p:nvSpPr>
-          <p:cNvPr id="177" name="Google Shape;177;g4ebcf7c756_0_22:notes"/>
+          <p:cNvPr id="177" name="Google Shape;177;g4e9aba5072_0_5:notes"/>
           <p:cNvSpPr/>
           <p:nvPr>
             <p:ph idx="2" type="sldImg"/>
@@ -1744,7 +1644,7 @@
       </p:sp>
       <p:sp>
         <p:nvSpPr>
-          <p:cNvPr id="178" name="Google Shape;178;g4ebcf7c756_0_22:notes"/>
+          <p:cNvPr id="178" name="Google Shape;178;g4e9aba5072_0_5:notes"/>
           <p:cNvSpPr txBox="1"/>
           <p:nvPr>
             <p:ph idx="1" type="body"/>
@@ -1794,7 +1694,7 @@
   <p:cSld>
     <p:spTree>
       <p:nvGrpSpPr>
-        <p:cNvPr id="183" name="Shape 183"/>
+        <p:cNvPr id="184" name="Shape 184"/>
         <p:cNvGrpSpPr/>
         <p:nvPr/>
       </p:nvGrpSpPr>
@@ -1808,7 +1708,7 @@
       </p:grpSpPr>
       <p:sp>
         <p:nvSpPr>
-          <p:cNvPr id="184" name="Google Shape;184;g4e9aba5072_0_5:notes"/>
+          <p:cNvPr id="185" name="Google Shape;185;g4ebcf7c756_0_8:notes"/>
           <p:cNvSpPr/>
           <p:nvPr>
             <p:ph idx="2" type="sldImg"/>
@@ -1843,7 +1743,7 @@
       </p:sp>
       <p:sp>
         <p:nvSpPr>
-          <p:cNvPr id="185" name="Google Shape;185;g4e9aba5072_0_5:notes"/>
+          <p:cNvPr id="186" name="Google Shape;186;g4ebcf7c756_0_8:notes"/>
           <p:cNvSpPr txBox="1"/>
           <p:nvPr>
             <p:ph idx="1" type="body"/>
@@ -10154,7 +10054,7 @@
   <p:cSld>
     <p:spTree>
       <p:nvGrpSpPr>
-        <p:cNvPr id="194" name="Shape 194"/>
+        <p:cNvPr id="195" name="Shape 195"/>
         <p:cNvGrpSpPr/>
         <p:nvPr/>
       </p:nvGrpSpPr>
@@ -10168,168 +10068,7 @@
       </p:grpSpPr>
       <p:sp>
         <p:nvSpPr>
-          <p:cNvPr id="195" name="Google Shape;195;p22"/>
-          <p:cNvSpPr txBox="1"/>
-          <p:nvPr>
-            <p:ph type="title"/>
-          </p:nvPr>
-        </p:nvSpPr>
-        <p:spPr>
-          <a:xfrm>
-            <a:off x="1115900" y="362900"/>
-            <a:ext cx="7038900" cy="914100"/>
-          </a:xfrm>
-          <a:prstGeom prst="rect">
-            <a:avLst/>
-          </a:prstGeom>
-        </p:spPr>
-        <p:txBody>
-          <a:bodyPr anchorCtr="0" anchor="t" bIns="91425" lIns="91425" spcFirstLastPara="1" rIns="91425" wrap="square" tIns="91425">
-            <a:noAutofit/>
-          </a:bodyPr>
-          <a:lstStyle/>
-          <a:p>
-            <a:pPr indent="0" lvl="0" marL="0" rtl="0" algn="l">
-              <a:spcBef>
-                <a:spcPts val="0"/>
-              </a:spcBef>
-              <a:spcAft>
-                <a:spcPts val="0"/>
-              </a:spcAft>
-              <a:buNone/>
-            </a:pPr>
-            <a:r>
-              <a:rPr lang="en"/>
-              <a:t>Backlog: Feb. 05</a:t>
-            </a:r>
-            <a:endParaRPr/>
-          </a:p>
-        </p:txBody>
-      </p:sp>
-      <p:sp>
-        <p:nvSpPr>
           <p:cNvPr id="196" name="Google Shape;196;p22"/>
-          <p:cNvSpPr txBox="1"/>
-          <p:nvPr>
-            <p:ph idx="1" type="body"/>
-          </p:nvPr>
-        </p:nvSpPr>
-        <p:spPr>
-          <a:xfrm>
-            <a:off x="1300425" y="3799500"/>
-            <a:ext cx="2648100" cy="537600"/>
-          </a:xfrm>
-          <a:prstGeom prst="rect">
-            <a:avLst/>
-          </a:prstGeom>
-        </p:spPr>
-        <p:txBody>
-          <a:bodyPr anchorCtr="0" anchor="t" bIns="91425" lIns="91425" spcFirstLastPara="1" rIns="91425" wrap="square" tIns="91425">
-            <a:noAutofit/>
-          </a:bodyPr>
-          <a:lstStyle/>
-          <a:p>
-            <a:pPr indent="0" lvl="0" marL="0" rtl="0" algn="l">
-              <a:spcBef>
-                <a:spcPts val="0"/>
-              </a:spcBef>
-              <a:spcAft>
-                <a:spcPts val="1600"/>
-              </a:spcAft>
-              <a:buNone/>
-            </a:pPr>
-            <a:r>
-              <a:rPr lang="en"/>
-              <a:t>We have a lot to do...</a:t>
-            </a:r>
-            <a:endParaRPr/>
-          </a:p>
-        </p:txBody>
-      </p:sp>
-      <p:pic>
-        <p:nvPicPr>
-          <p:cNvPr id="197" name="Google Shape;197;p22"/>
-          <p:cNvPicPr preferRelativeResize="0"/>
-          <p:nvPr/>
-        </p:nvPicPr>
-        <p:blipFill>
-          <a:blip r:embed="rId3">
-            <a:alphaModFix/>
-          </a:blip>
-          <a:stretch>
-            <a:fillRect/>
-          </a:stretch>
-        </p:blipFill>
-        <p:spPr>
-          <a:xfrm>
-            <a:off x="4667625" y="1807575"/>
-            <a:ext cx="3705150" cy="2972800"/>
-          </a:xfrm>
-          <a:prstGeom prst="rect">
-            <a:avLst/>
-          </a:prstGeom>
-          <a:noFill/>
-          <a:ln>
-            <a:noFill/>
-          </a:ln>
-        </p:spPr>
-      </p:pic>
-      <p:pic>
-        <p:nvPicPr>
-          <p:cNvPr id="198" name="Google Shape;198;p22"/>
-          <p:cNvPicPr preferRelativeResize="0"/>
-          <p:nvPr/>
-        </p:nvPicPr>
-        <p:blipFill>
-          <a:blip r:embed="rId4">
-            <a:alphaModFix/>
-          </a:blip>
-          <a:stretch>
-            <a:fillRect/>
-          </a:stretch>
-        </p:blipFill>
-        <p:spPr>
-          <a:xfrm>
-            <a:off x="1065050" y="1099025"/>
-            <a:ext cx="4959300" cy="2111275"/>
-          </a:xfrm>
-          <a:prstGeom prst="rect">
-            <a:avLst/>
-          </a:prstGeom>
-          <a:noFill/>
-          <a:ln>
-            <a:noFill/>
-          </a:ln>
-        </p:spPr>
-      </p:pic>
-    </p:spTree>
-  </p:cSld>
-  <p:clrMapOvr>
-    <a:masterClrMapping/>
-  </p:clrMapOvr>
-</p:sld>
-</file>
-
-<file path=ppt/slides/slide11.xml><?xml version="1.0" encoding="utf-8"?>
-<p:sld xmlns:a="http://schemas.openxmlformats.org/drawingml/2006/main" xmlns:r="http://schemas.openxmlformats.org/officeDocument/2006/relationships" xmlns:mc="http://schemas.openxmlformats.org/markup-compatibility/2006" xmlns:mv="urn:schemas-microsoft-com:mac:vml" xmlns:p="http://schemas.openxmlformats.org/presentationml/2006/main" xmlns:c="http://schemas.openxmlformats.org/drawingml/2006/chart" xmlns:dgm="http://schemas.openxmlformats.org/drawingml/2006/diagram" xmlns:o="urn:schemas-microsoft-com:office:office" xmlns:v="urn:schemas-microsoft-com:vml" xmlns:pvml="urn:schemas-microsoft-com:office:powerpoint" xmlns:com="http://schemas.openxmlformats.org/drawingml/2006/compatibility" xmlns:p14="http://schemas.microsoft.com/office/powerpoint/2010/main" xmlns:p15="http://schemas.microsoft.com/office/powerpoint/2012/main">
-  <p:cSld>
-    <p:spTree>
-      <p:nvGrpSpPr>
-        <p:cNvPr id="202" name="Shape 202"/>
-        <p:cNvGrpSpPr/>
-        <p:nvPr/>
-      </p:nvGrpSpPr>
-      <p:grpSpPr>
-        <a:xfrm>
-          <a:off x="0" y="0"/>
-          <a:ext cx="0" cy="0"/>
-          <a:chOff x="0" y="0"/>
-          <a:chExt cx="0" cy="0"/>
-        </a:xfrm>
-      </p:grpSpPr>
-      <p:sp>
-        <p:nvSpPr>
-          <p:cNvPr id="203" name="Google Shape;203;p23"/>
           <p:cNvSpPr txBox="1"/>
           <p:nvPr>
             <p:ph type="title"/>
@@ -10369,7 +10108,7 @@
       </p:sp>
       <p:sp>
         <p:nvSpPr>
-          <p:cNvPr id="204" name="Google Shape;204;p23"/>
+          <p:cNvPr id="197" name="Google Shape;197;p22"/>
           <p:cNvSpPr txBox="1"/>
           <p:nvPr>
             <p:ph idx="1" type="body"/>
@@ -10471,12 +10210,12 @@
 </p:sld>
 </file>
 
-<file path=ppt/slides/slide12.xml><?xml version="1.0" encoding="utf-8"?>
+<file path=ppt/slides/slide11.xml><?xml version="1.0" encoding="utf-8"?>
 <p:sld xmlns:a="http://schemas.openxmlformats.org/drawingml/2006/main" xmlns:r="http://schemas.openxmlformats.org/officeDocument/2006/relationships" xmlns:mc="http://schemas.openxmlformats.org/markup-compatibility/2006" xmlns:mv="urn:schemas-microsoft-com:mac:vml" xmlns:p="http://schemas.openxmlformats.org/presentationml/2006/main" xmlns:c="http://schemas.openxmlformats.org/drawingml/2006/chart" xmlns:dgm="http://schemas.openxmlformats.org/drawingml/2006/diagram" xmlns:o="urn:schemas-microsoft-com:office:office" xmlns:v="urn:schemas-microsoft-com:vml" xmlns:pvml="urn:schemas-microsoft-com:office:powerpoint" xmlns:com="http://schemas.openxmlformats.org/drawingml/2006/compatibility" xmlns:p14="http://schemas.microsoft.com/office/powerpoint/2010/main" xmlns:p15="http://schemas.microsoft.com/office/powerpoint/2012/main">
   <p:cSld>
     <p:spTree>
       <p:nvGrpSpPr>
-        <p:cNvPr id="208" name="Shape 208"/>
+        <p:cNvPr id="201" name="Shape 201"/>
         <p:cNvGrpSpPr/>
         <p:nvPr/>
       </p:nvGrpSpPr>
@@ -10490,7 +10229,7 @@
       </p:grpSpPr>
       <p:sp>
         <p:nvSpPr>
-          <p:cNvPr id="209" name="Google Shape;209;p24"/>
+          <p:cNvPr id="202" name="Google Shape;202;p23"/>
           <p:cNvSpPr txBox="1"/>
           <p:nvPr>
             <p:ph type="title"/>
@@ -10530,7 +10269,7 @@
       </p:sp>
       <p:sp>
         <p:nvSpPr>
-          <p:cNvPr id="210" name="Google Shape;210;p24"/>
+          <p:cNvPr id="203" name="Google Shape;203;p23"/>
           <p:cNvSpPr txBox="1"/>
           <p:nvPr>
             <p:ph idx="1" type="body"/>
@@ -11985,139 +11724,6 @@
         </p:nvSpPr>
         <p:spPr>
           <a:xfrm>
-            <a:off x="1239350" y="444600"/>
-            <a:ext cx="7038900" cy="914100"/>
-          </a:xfrm>
-          <a:prstGeom prst="rect">
-            <a:avLst/>
-          </a:prstGeom>
-        </p:spPr>
-        <p:txBody>
-          <a:bodyPr anchorCtr="0" anchor="t" bIns="91425" lIns="91425" spcFirstLastPara="1" rIns="91425" wrap="square" tIns="91425">
-            <a:noAutofit/>
-          </a:bodyPr>
-          <a:lstStyle/>
-          <a:p>
-            <a:pPr indent="0" lvl="0" marL="0" rtl="0" algn="l">
-              <a:spcBef>
-                <a:spcPts val="0"/>
-              </a:spcBef>
-              <a:spcAft>
-                <a:spcPts val="0"/>
-              </a:spcAft>
-              <a:buNone/>
-            </a:pPr>
-            <a:r>
-              <a:rPr lang="en"/>
-              <a:t>Creating a database in MongoDB</a:t>
-            </a:r>
-            <a:endParaRPr/>
-          </a:p>
-        </p:txBody>
-      </p:sp>
-      <p:sp>
-        <p:nvSpPr>
-          <p:cNvPr id="181" name="Google Shape;181;p20"/>
-          <p:cNvSpPr txBox="1"/>
-          <p:nvPr>
-            <p:ph idx="1" type="body"/>
-          </p:nvPr>
-        </p:nvSpPr>
-        <p:spPr>
-          <a:xfrm>
-            <a:off x="1551775" y="1603850"/>
-            <a:ext cx="2683500" cy="2911200"/>
-          </a:xfrm>
-          <a:prstGeom prst="rect">
-            <a:avLst/>
-          </a:prstGeom>
-        </p:spPr>
-        <p:txBody>
-          <a:bodyPr anchorCtr="0" anchor="t" bIns="91425" lIns="91425" spcFirstLastPara="1" rIns="91425" wrap="square" tIns="91425">
-            <a:noAutofit/>
-          </a:bodyPr>
-          <a:lstStyle/>
-          <a:p>
-            <a:pPr indent="0" lvl="0" marL="0" rtl="0" algn="l">
-              <a:spcBef>
-                <a:spcPts val="0"/>
-              </a:spcBef>
-              <a:spcAft>
-                <a:spcPts val="1600"/>
-              </a:spcAft>
-              <a:buNone/>
-            </a:pPr>
-            <a:r>
-              <a:rPr lang="en"/>
-              <a:t>Our database creation all follows this format:</a:t>
-            </a:r>
-            <a:endParaRPr/>
-          </a:p>
-        </p:txBody>
-      </p:sp>
-      <p:pic>
-        <p:nvPicPr>
-          <p:cNvPr id="182" name="Google Shape;182;p20"/>
-          <p:cNvPicPr preferRelativeResize="0"/>
-          <p:nvPr/>
-        </p:nvPicPr>
-        <p:blipFill>
-          <a:blip r:embed="rId3">
-            <a:alphaModFix/>
-          </a:blip>
-          <a:stretch>
-            <a:fillRect/>
-          </a:stretch>
-        </p:blipFill>
-        <p:spPr>
-          <a:xfrm>
-            <a:off x="4300500" y="1700000"/>
-            <a:ext cx="4618449" cy="2237732"/>
-          </a:xfrm>
-          <a:prstGeom prst="rect">
-            <a:avLst/>
-          </a:prstGeom>
-          <a:noFill/>
-          <a:ln>
-            <a:noFill/>
-          </a:ln>
-        </p:spPr>
-      </p:pic>
-    </p:spTree>
-  </p:cSld>
-  <p:clrMapOvr>
-    <a:masterClrMapping/>
-  </p:clrMapOvr>
-</p:sld>
-</file>
-
-<file path=ppt/slides/slide9.xml><?xml version="1.0" encoding="utf-8"?>
-<p:sld xmlns:a="http://schemas.openxmlformats.org/drawingml/2006/main" xmlns:r="http://schemas.openxmlformats.org/officeDocument/2006/relationships" xmlns:mc="http://schemas.openxmlformats.org/markup-compatibility/2006" xmlns:mv="urn:schemas-microsoft-com:mac:vml" xmlns:p="http://schemas.openxmlformats.org/presentationml/2006/main" xmlns:c="http://schemas.openxmlformats.org/drawingml/2006/chart" xmlns:dgm="http://schemas.openxmlformats.org/drawingml/2006/diagram" xmlns:o="urn:schemas-microsoft-com:office:office" xmlns:v="urn:schemas-microsoft-com:vml" xmlns:pvml="urn:schemas-microsoft-com:office:powerpoint" xmlns:com="http://schemas.openxmlformats.org/drawingml/2006/compatibility" xmlns:p14="http://schemas.microsoft.com/office/powerpoint/2010/main" xmlns:p15="http://schemas.microsoft.com/office/powerpoint/2012/main">
-  <p:cSld>
-    <p:spTree>
-      <p:nvGrpSpPr>
-        <p:cNvPr id="186" name="Shape 186"/>
-        <p:cNvGrpSpPr/>
-        <p:nvPr/>
-      </p:nvGrpSpPr>
-      <p:grpSpPr>
-        <a:xfrm>
-          <a:off x="0" y="0"/>
-          <a:ext cx="0" cy="0"/>
-          <a:chOff x="0" y="0"/>
-          <a:chExt cx="0" cy="0"/>
-        </a:xfrm>
-      </p:grpSpPr>
-      <p:sp>
-        <p:nvSpPr>
-          <p:cNvPr id="187" name="Google Shape;187;p21"/>
-          <p:cNvSpPr txBox="1"/>
-          <p:nvPr>
-            <p:ph type="title"/>
-          </p:nvPr>
-        </p:nvSpPr>
-        <p:spPr>
-          <a:xfrm>
             <a:off x="1173900" y="400975"/>
             <a:ext cx="7038900" cy="914100"/>
           </a:xfrm>
@@ -12150,7 +11756,7 @@
       </p:sp>
       <p:sp>
         <p:nvSpPr>
-          <p:cNvPr id="188" name="Google Shape;188;p21"/>
+          <p:cNvPr id="181" name="Google Shape;181;p20"/>
           <p:cNvSpPr txBox="1"/>
           <p:nvPr>
             <p:ph idx="1" type="body"/>
@@ -12190,7 +11796,7 @@
       </p:sp>
       <p:pic>
         <p:nvPicPr>
-          <p:cNvPr id="189" name="Google Shape;189;p21"/>
+          <p:cNvPr id="182" name="Google Shape;182;p20"/>
           <p:cNvPicPr preferRelativeResize="0"/>
           <p:nvPr/>
         </p:nvPicPr>
@@ -12218,7 +11824,7 @@
       </p:pic>
       <p:pic>
         <p:nvPicPr>
-          <p:cNvPr id="190" name="Google Shape;190;p21"/>
+          <p:cNvPr id="183" name="Google Shape;183;p20"/>
           <p:cNvPicPr preferRelativeResize="0"/>
           <p:nvPr/>
         </p:nvPicPr>
@@ -12234,6 +11840,167 @@
           <a:xfrm>
             <a:off x="4569575" y="780500"/>
             <a:ext cx="4286249" cy="2128150"/>
+          </a:xfrm>
+          <a:prstGeom prst="rect">
+            <a:avLst/>
+          </a:prstGeom>
+          <a:noFill/>
+          <a:ln>
+            <a:noFill/>
+          </a:ln>
+        </p:spPr>
+      </p:pic>
+    </p:spTree>
+  </p:cSld>
+  <p:clrMapOvr>
+    <a:masterClrMapping/>
+  </p:clrMapOvr>
+</p:sld>
+</file>
+
+<file path=ppt/slides/slide9.xml><?xml version="1.0" encoding="utf-8"?>
+<p:sld xmlns:a="http://schemas.openxmlformats.org/drawingml/2006/main" xmlns:r="http://schemas.openxmlformats.org/officeDocument/2006/relationships" xmlns:mc="http://schemas.openxmlformats.org/markup-compatibility/2006" xmlns:mv="urn:schemas-microsoft-com:mac:vml" xmlns:p="http://schemas.openxmlformats.org/presentationml/2006/main" xmlns:c="http://schemas.openxmlformats.org/drawingml/2006/chart" xmlns:dgm="http://schemas.openxmlformats.org/drawingml/2006/diagram" xmlns:o="urn:schemas-microsoft-com:office:office" xmlns:v="urn:schemas-microsoft-com:vml" xmlns:pvml="urn:schemas-microsoft-com:office:powerpoint" xmlns:com="http://schemas.openxmlformats.org/drawingml/2006/compatibility" xmlns:p14="http://schemas.microsoft.com/office/powerpoint/2010/main" xmlns:p15="http://schemas.microsoft.com/office/powerpoint/2012/main">
+  <p:cSld>
+    <p:spTree>
+      <p:nvGrpSpPr>
+        <p:cNvPr id="187" name="Shape 187"/>
+        <p:cNvGrpSpPr/>
+        <p:nvPr/>
+      </p:nvGrpSpPr>
+      <p:grpSpPr>
+        <a:xfrm>
+          <a:off x="0" y="0"/>
+          <a:ext cx="0" cy="0"/>
+          <a:chOff x="0" y="0"/>
+          <a:chExt cx="0" cy="0"/>
+        </a:xfrm>
+      </p:grpSpPr>
+      <p:sp>
+        <p:nvSpPr>
+          <p:cNvPr id="188" name="Google Shape;188;p21"/>
+          <p:cNvSpPr txBox="1"/>
+          <p:nvPr>
+            <p:ph type="title"/>
+          </p:nvPr>
+        </p:nvSpPr>
+        <p:spPr>
+          <a:xfrm>
+            <a:off x="1115900" y="362900"/>
+            <a:ext cx="7038900" cy="914100"/>
+          </a:xfrm>
+          <a:prstGeom prst="rect">
+            <a:avLst/>
+          </a:prstGeom>
+        </p:spPr>
+        <p:txBody>
+          <a:bodyPr anchorCtr="0" anchor="t" bIns="91425" lIns="91425" spcFirstLastPara="1" rIns="91425" wrap="square" tIns="91425">
+            <a:noAutofit/>
+          </a:bodyPr>
+          <a:lstStyle/>
+          <a:p>
+            <a:pPr indent="0" lvl="0" marL="0" rtl="0" algn="l">
+              <a:spcBef>
+                <a:spcPts val="0"/>
+              </a:spcBef>
+              <a:spcAft>
+                <a:spcPts val="0"/>
+              </a:spcAft>
+              <a:buNone/>
+            </a:pPr>
+            <a:r>
+              <a:rPr lang="en"/>
+              <a:t>Backlog: Feb. 05</a:t>
+            </a:r>
+            <a:endParaRPr/>
+          </a:p>
+        </p:txBody>
+      </p:sp>
+      <p:sp>
+        <p:nvSpPr>
+          <p:cNvPr id="189" name="Google Shape;189;p21"/>
+          <p:cNvSpPr txBox="1"/>
+          <p:nvPr>
+            <p:ph idx="1" type="body"/>
+          </p:nvPr>
+        </p:nvSpPr>
+        <p:spPr>
+          <a:xfrm>
+            <a:off x="1300425" y="3799500"/>
+            <a:ext cx="2648100" cy="537600"/>
+          </a:xfrm>
+          <a:prstGeom prst="rect">
+            <a:avLst/>
+          </a:prstGeom>
+        </p:spPr>
+        <p:txBody>
+          <a:bodyPr anchorCtr="0" anchor="t" bIns="91425" lIns="91425" spcFirstLastPara="1" rIns="91425" wrap="square" tIns="91425">
+            <a:noAutofit/>
+          </a:bodyPr>
+          <a:lstStyle/>
+          <a:p>
+            <a:pPr indent="0" lvl="0" marL="0" rtl="0" algn="l">
+              <a:spcBef>
+                <a:spcPts val="0"/>
+              </a:spcBef>
+              <a:spcAft>
+                <a:spcPts val="1600"/>
+              </a:spcAft>
+              <a:buNone/>
+            </a:pPr>
+            <a:r>
+              <a:rPr lang="en"/>
+              <a:t>We have a lot to do...</a:t>
+            </a:r>
+            <a:endParaRPr/>
+          </a:p>
+        </p:txBody>
+      </p:sp>
+      <p:pic>
+        <p:nvPicPr>
+          <p:cNvPr id="190" name="Google Shape;190;p21"/>
+          <p:cNvPicPr preferRelativeResize="0"/>
+          <p:nvPr/>
+        </p:nvPicPr>
+        <p:blipFill>
+          <a:blip r:embed="rId3">
+            <a:alphaModFix/>
+          </a:blip>
+          <a:stretch>
+            <a:fillRect/>
+          </a:stretch>
+        </p:blipFill>
+        <p:spPr>
+          <a:xfrm>
+            <a:off x="4667625" y="1807575"/>
+            <a:ext cx="3705150" cy="2972800"/>
+          </a:xfrm>
+          <a:prstGeom prst="rect">
+            <a:avLst/>
+          </a:prstGeom>
+          <a:noFill/>
+          <a:ln>
+            <a:noFill/>
+          </a:ln>
+        </p:spPr>
+      </p:pic>
+      <p:pic>
+        <p:nvPicPr>
+          <p:cNvPr id="191" name="Google Shape;191;p21"/>
+          <p:cNvPicPr preferRelativeResize="0"/>
+          <p:nvPr/>
+        </p:nvPicPr>
+        <p:blipFill>
+          <a:blip r:embed="rId4">
+            <a:alphaModFix/>
+          </a:blip>
+          <a:stretch>
+            <a:fillRect/>
+          </a:stretch>
+        </p:blipFill>
+        <p:spPr>
+          <a:xfrm>
+            <a:off x="1065050" y="1099025"/>
+            <a:ext cx="4959300" cy="2111275"/>
           </a:xfrm>
           <a:prstGeom prst="rect">
             <a:avLst/>

</xml_diff>

<commit_message>
Updated Feb 7 presentation
</commit_message>
<xml_diff>
--- a/documentation/slides/PresentationFeb7.pptx
+++ b/documentation/slides/PresentationFeb7.pptx
@@ -19,23 +19,26 @@
     <p:sldId id="264" r:id="rId13"/>
     <p:sldId id="265" r:id="rId14"/>
     <p:sldId id="266" r:id="rId15"/>
+    <p:sldId id="267" r:id="rId16"/>
+    <p:sldId id="268" r:id="rId17"/>
+    <p:sldId id="269" r:id="rId18"/>
   </p:sldIdLst>
   <p:sldSz cy="5143500" cx="9144000"/>
   <p:notesSz cx="6858000" cy="9144000"/>
   <p:embeddedFontLst>
     <p:embeddedFont>
       <p:font typeface="Montserrat"/>
-      <p:regular r:id="rId16"/>
-      <p:bold r:id="rId17"/>
-      <p:italic r:id="rId18"/>
-      <p:boldItalic r:id="rId19"/>
+      <p:regular r:id="rId19"/>
+      <p:bold r:id="rId20"/>
+      <p:italic r:id="rId21"/>
+      <p:boldItalic r:id="rId22"/>
     </p:embeddedFont>
     <p:embeddedFont>
       <p:font typeface="Lato"/>
-      <p:regular r:id="rId20"/>
-      <p:bold r:id="rId21"/>
-      <p:italic r:id="rId22"/>
-      <p:boldItalic r:id="rId23"/>
+      <p:regular r:id="rId23"/>
+      <p:bold r:id="rId24"/>
+      <p:italic r:id="rId25"/>
+      <p:boldItalic r:id="rId26"/>
     </p:embeddedFont>
   </p:embeddedFontLst>
   <p:defaultTextStyle>
@@ -780,7 +783,7 @@
             </a:pPr>
             <a:r>
               <a:rPr lang="en"/>
-              <a:t>Patti will present this slide.</a:t>
+              <a:t>Josh</a:t>
             </a:r>
             <a:endParaRPr/>
           </a:p>
@@ -799,7 +802,7 @@
   <p:cSld>
     <p:spTree>
       <p:nvGrpSpPr>
-        <p:cNvPr id="192" name="Shape 192"/>
+        <p:cNvPr id="187" name="Shape 187"/>
         <p:cNvGrpSpPr/>
         <p:nvPr/>
       </p:nvGrpSpPr>
@@ -813,7 +816,7 @@
       </p:grpSpPr>
       <p:sp>
         <p:nvSpPr>
-          <p:cNvPr id="193" name="Google Shape;193;g4f497c7c11_0_0:notes"/>
+          <p:cNvPr id="188" name="Google Shape;188;g4ebcf7c756_0_16:notes"/>
           <p:cNvSpPr/>
           <p:nvPr>
             <p:ph idx="2" type="sldImg"/>
@@ -848,7 +851,7 @@
       </p:sp>
       <p:sp>
         <p:nvSpPr>
-          <p:cNvPr id="194" name="Google Shape;194;g4f497c7c11_0_0:notes"/>
+          <p:cNvPr id="189" name="Google Shape;189;g4ebcf7c756_0_16:notes"/>
           <p:cNvSpPr txBox="1"/>
           <p:nvPr>
             <p:ph idx="1" type="body"/>
@@ -879,7 +882,8 @@
               <a:buNone/>
             </a:pPr>
             <a:r>
-              <a:t/>
+              <a:rPr lang="en"/>
+              <a:t>Morgan. Dataflow. We will have multiple instances of massmine running, and ports to separate them.</a:t>
             </a:r>
             <a:endParaRPr/>
           </a:p>
@@ -898,7 +902,7 @@
   <p:cSld>
     <p:spTree>
       <p:nvGrpSpPr>
-        <p:cNvPr id="198" name="Shape 198"/>
+        <p:cNvPr id="194" name="Shape 194"/>
         <p:cNvGrpSpPr/>
         <p:nvPr/>
       </p:nvGrpSpPr>
@@ -912,7 +916,7 @@
       </p:grpSpPr>
       <p:sp>
         <p:nvSpPr>
-          <p:cNvPr id="199" name="Google Shape;199;g4e69c96881_0_25:notes"/>
+          <p:cNvPr id="195" name="Google Shape;195;g4e9aba5072_0_5:notes"/>
           <p:cNvSpPr/>
           <p:nvPr>
             <p:ph idx="2" type="sldImg"/>
@@ -947,7 +951,304 @@
       </p:sp>
       <p:sp>
         <p:nvSpPr>
-          <p:cNvPr id="200" name="Google Shape;200;g4e69c96881_0_25:notes"/>
+          <p:cNvPr id="196" name="Google Shape;196;g4e9aba5072_0_5:notes"/>
+          <p:cNvSpPr txBox="1"/>
+          <p:nvPr>
+            <p:ph idx="1" type="body"/>
+          </p:nvPr>
+        </p:nvSpPr>
+        <p:spPr>
+          <a:xfrm>
+            <a:off x="685800" y="4343400"/>
+            <a:ext cx="5486400" cy="4114800"/>
+          </a:xfrm>
+          <a:prstGeom prst="rect">
+            <a:avLst/>
+          </a:prstGeom>
+        </p:spPr>
+        <p:txBody>
+          <a:bodyPr anchorCtr="0" anchor="t" bIns="91425" lIns="91425" spcFirstLastPara="1" rIns="91425" wrap="square" tIns="91425">
+            <a:noAutofit/>
+          </a:bodyPr>
+          <a:lstStyle/>
+          <a:p>
+            <a:pPr indent="0" lvl="0" marL="0" rtl="0" algn="l">
+              <a:spcBef>
+                <a:spcPts val="0"/>
+              </a:spcBef>
+              <a:spcAft>
+                <a:spcPts val="0"/>
+              </a:spcAft>
+              <a:buNone/>
+            </a:pPr>
+            <a:r>
+              <a:t/>
+            </a:r>
+            <a:endParaRPr/>
+          </a:p>
+        </p:txBody>
+      </p:sp>
+    </p:spTree>
+  </p:cSld>
+  <p:clrMapOvr>
+    <a:masterClrMapping/>
+  </p:clrMapOvr>
+</p:notes>
+</file>
+
+<file path=ppt/notesSlides/notesSlide12.xml><?xml version="1.0" encoding="utf-8"?>
+<p:notes xmlns:a="http://schemas.openxmlformats.org/drawingml/2006/main" xmlns:r="http://schemas.openxmlformats.org/officeDocument/2006/relationships" xmlns:mc="http://schemas.openxmlformats.org/markup-compatibility/2006" xmlns:mv="urn:schemas-microsoft-com:mac:vml" xmlns:p="http://schemas.openxmlformats.org/presentationml/2006/main" xmlns:c="http://schemas.openxmlformats.org/drawingml/2006/chart" xmlns:dgm="http://schemas.openxmlformats.org/drawingml/2006/diagram" xmlns:o="urn:schemas-microsoft-com:office:office" xmlns:v="urn:schemas-microsoft-com:vml" xmlns:pvml="urn:schemas-microsoft-com:office:powerpoint" xmlns:com="http://schemas.openxmlformats.org/drawingml/2006/compatibility" xmlns:p14="http://schemas.microsoft.com/office/powerpoint/2010/main" xmlns:p15="http://schemas.microsoft.com/office/powerpoint/2012/main" showMasterPhAnim="0" showMasterSp="0">
+  <p:cSld>
+    <p:spTree>
+      <p:nvGrpSpPr>
+        <p:cNvPr id="202" name="Shape 202"/>
+        <p:cNvGrpSpPr/>
+        <p:nvPr/>
+      </p:nvGrpSpPr>
+      <p:grpSpPr>
+        <a:xfrm>
+          <a:off x="0" y="0"/>
+          <a:ext cx="0" cy="0"/>
+          <a:chOff x="0" y="0"/>
+          <a:chExt cx="0" cy="0"/>
+        </a:xfrm>
+      </p:grpSpPr>
+      <p:sp>
+        <p:nvSpPr>
+          <p:cNvPr id="203" name="Google Shape;203;g4ebcf7c756_0_8:notes"/>
+          <p:cNvSpPr/>
+          <p:nvPr>
+            <p:ph idx="2" type="sldImg"/>
+          </p:nvPr>
+        </p:nvSpPr>
+        <p:spPr>
+          <a:xfrm>
+            <a:off x="381300" y="685800"/>
+            <a:ext cx="6096000" cy="3429000"/>
+          </a:xfrm>
+          <a:custGeom>
+            <a:rect b="b" l="l" r="r" t="t"/>
+            <a:pathLst>
+              <a:path extrusionOk="0" h="120000" w="120000">
+                <a:moveTo>
+                  <a:pt x="0" y="0"/>
+                </a:moveTo>
+                <a:lnTo>
+                  <a:pt x="120000" y="0"/>
+                </a:lnTo>
+                <a:lnTo>
+                  <a:pt x="120000" y="120000"/>
+                </a:lnTo>
+                <a:lnTo>
+                  <a:pt x="0" y="120000"/>
+                </a:lnTo>
+                <a:close/>
+              </a:path>
+            </a:pathLst>
+          </a:custGeom>
+        </p:spPr>
+      </p:sp>
+      <p:sp>
+        <p:nvSpPr>
+          <p:cNvPr id="204" name="Google Shape;204;g4ebcf7c756_0_8:notes"/>
+          <p:cNvSpPr txBox="1"/>
+          <p:nvPr>
+            <p:ph idx="1" type="body"/>
+          </p:nvPr>
+        </p:nvSpPr>
+        <p:spPr>
+          <a:xfrm>
+            <a:off x="685800" y="4343400"/>
+            <a:ext cx="5486400" cy="4114800"/>
+          </a:xfrm>
+          <a:prstGeom prst="rect">
+            <a:avLst/>
+          </a:prstGeom>
+        </p:spPr>
+        <p:txBody>
+          <a:bodyPr anchorCtr="0" anchor="t" bIns="91425" lIns="91425" spcFirstLastPara="1" rIns="91425" wrap="square" tIns="91425">
+            <a:noAutofit/>
+          </a:bodyPr>
+          <a:lstStyle/>
+          <a:p>
+            <a:pPr indent="0" lvl="0" marL="0" rtl="0" algn="l">
+              <a:spcBef>
+                <a:spcPts val="0"/>
+              </a:spcBef>
+              <a:spcAft>
+                <a:spcPts val="0"/>
+              </a:spcAft>
+              <a:buNone/>
+            </a:pPr>
+            <a:r>
+              <a:t/>
+            </a:r>
+            <a:endParaRPr/>
+          </a:p>
+        </p:txBody>
+      </p:sp>
+    </p:spTree>
+  </p:cSld>
+  <p:clrMapOvr>
+    <a:masterClrMapping/>
+  </p:clrMapOvr>
+</p:notes>
+</file>
+
+<file path=ppt/notesSlides/notesSlide13.xml><?xml version="1.0" encoding="utf-8"?>
+<p:notes xmlns:a="http://schemas.openxmlformats.org/drawingml/2006/main" xmlns:r="http://schemas.openxmlformats.org/officeDocument/2006/relationships" xmlns:mc="http://schemas.openxmlformats.org/markup-compatibility/2006" xmlns:mv="urn:schemas-microsoft-com:mac:vml" xmlns:p="http://schemas.openxmlformats.org/presentationml/2006/main" xmlns:c="http://schemas.openxmlformats.org/drawingml/2006/chart" xmlns:dgm="http://schemas.openxmlformats.org/drawingml/2006/diagram" xmlns:o="urn:schemas-microsoft-com:office:office" xmlns:v="urn:schemas-microsoft-com:vml" xmlns:pvml="urn:schemas-microsoft-com:office:powerpoint" xmlns:com="http://schemas.openxmlformats.org/drawingml/2006/compatibility" xmlns:p14="http://schemas.microsoft.com/office/powerpoint/2010/main" xmlns:p15="http://schemas.microsoft.com/office/powerpoint/2012/main" showMasterPhAnim="0" showMasterSp="0">
+  <p:cSld>
+    <p:spTree>
+      <p:nvGrpSpPr>
+        <p:cNvPr id="210" name="Shape 210"/>
+        <p:cNvGrpSpPr/>
+        <p:nvPr/>
+      </p:nvGrpSpPr>
+      <p:grpSpPr>
+        <a:xfrm>
+          <a:off x="0" y="0"/>
+          <a:ext cx="0" cy="0"/>
+          <a:chOff x="0" y="0"/>
+          <a:chExt cx="0" cy="0"/>
+        </a:xfrm>
+      </p:grpSpPr>
+      <p:sp>
+        <p:nvSpPr>
+          <p:cNvPr id="211" name="Google Shape;211;g4f497c7c11_0_0:notes"/>
+          <p:cNvSpPr/>
+          <p:nvPr>
+            <p:ph idx="2" type="sldImg"/>
+          </p:nvPr>
+        </p:nvSpPr>
+        <p:spPr>
+          <a:xfrm>
+            <a:off x="381300" y="685800"/>
+            <a:ext cx="6096000" cy="3429000"/>
+          </a:xfrm>
+          <a:custGeom>
+            <a:rect b="b" l="l" r="r" t="t"/>
+            <a:pathLst>
+              <a:path extrusionOk="0" h="120000" w="120000">
+                <a:moveTo>
+                  <a:pt x="0" y="0"/>
+                </a:moveTo>
+                <a:lnTo>
+                  <a:pt x="120000" y="0"/>
+                </a:lnTo>
+                <a:lnTo>
+                  <a:pt x="120000" y="120000"/>
+                </a:lnTo>
+                <a:lnTo>
+                  <a:pt x="0" y="120000"/>
+                </a:lnTo>
+                <a:close/>
+              </a:path>
+            </a:pathLst>
+          </a:custGeom>
+        </p:spPr>
+      </p:sp>
+      <p:sp>
+        <p:nvSpPr>
+          <p:cNvPr id="212" name="Google Shape;212;g4f497c7c11_0_0:notes"/>
+          <p:cNvSpPr txBox="1"/>
+          <p:nvPr>
+            <p:ph idx="1" type="body"/>
+          </p:nvPr>
+        </p:nvSpPr>
+        <p:spPr>
+          <a:xfrm>
+            <a:off x="685800" y="4343400"/>
+            <a:ext cx="5486400" cy="4114800"/>
+          </a:xfrm>
+          <a:prstGeom prst="rect">
+            <a:avLst/>
+          </a:prstGeom>
+        </p:spPr>
+        <p:txBody>
+          <a:bodyPr anchorCtr="0" anchor="t" bIns="91425" lIns="91425" spcFirstLastPara="1" rIns="91425" wrap="square" tIns="91425">
+            <a:noAutofit/>
+          </a:bodyPr>
+          <a:lstStyle/>
+          <a:p>
+            <a:pPr indent="0" lvl="0" marL="0" rtl="0" algn="l">
+              <a:spcBef>
+                <a:spcPts val="0"/>
+              </a:spcBef>
+              <a:spcAft>
+                <a:spcPts val="0"/>
+              </a:spcAft>
+              <a:buNone/>
+            </a:pPr>
+            <a:r>
+              <a:t/>
+            </a:r>
+            <a:endParaRPr/>
+          </a:p>
+        </p:txBody>
+      </p:sp>
+    </p:spTree>
+  </p:cSld>
+  <p:clrMapOvr>
+    <a:masterClrMapping/>
+  </p:clrMapOvr>
+</p:notes>
+</file>
+
+<file path=ppt/notesSlides/notesSlide14.xml><?xml version="1.0" encoding="utf-8"?>
+<p:notes xmlns:a="http://schemas.openxmlformats.org/drawingml/2006/main" xmlns:r="http://schemas.openxmlformats.org/officeDocument/2006/relationships" xmlns:mc="http://schemas.openxmlformats.org/markup-compatibility/2006" xmlns:mv="urn:schemas-microsoft-com:mac:vml" xmlns:p="http://schemas.openxmlformats.org/presentationml/2006/main" xmlns:c="http://schemas.openxmlformats.org/drawingml/2006/chart" xmlns:dgm="http://schemas.openxmlformats.org/drawingml/2006/diagram" xmlns:o="urn:schemas-microsoft-com:office:office" xmlns:v="urn:schemas-microsoft-com:vml" xmlns:pvml="urn:schemas-microsoft-com:office:powerpoint" xmlns:com="http://schemas.openxmlformats.org/drawingml/2006/compatibility" xmlns:p14="http://schemas.microsoft.com/office/powerpoint/2010/main" xmlns:p15="http://schemas.microsoft.com/office/powerpoint/2012/main" showMasterPhAnim="0" showMasterSp="0">
+  <p:cSld>
+    <p:spTree>
+      <p:nvGrpSpPr>
+        <p:cNvPr id="216" name="Shape 216"/>
+        <p:cNvGrpSpPr/>
+        <p:nvPr/>
+      </p:nvGrpSpPr>
+      <p:grpSpPr>
+        <a:xfrm>
+          <a:off x="0" y="0"/>
+          <a:ext cx="0" cy="0"/>
+          <a:chOff x="0" y="0"/>
+          <a:chExt cx="0" cy="0"/>
+        </a:xfrm>
+      </p:grpSpPr>
+      <p:sp>
+        <p:nvSpPr>
+          <p:cNvPr id="217" name="Google Shape;217;g4e69c96881_0_25:notes"/>
+          <p:cNvSpPr/>
+          <p:nvPr>
+            <p:ph idx="2" type="sldImg"/>
+          </p:nvPr>
+        </p:nvSpPr>
+        <p:spPr>
+          <a:xfrm>
+            <a:off x="381300" y="685800"/>
+            <a:ext cx="6096000" cy="3429000"/>
+          </a:xfrm>
+          <a:custGeom>
+            <a:rect b="b" l="l" r="r" t="t"/>
+            <a:pathLst>
+              <a:path extrusionOk="0" h="120000" w="120000">
+                <a:moveTo>
+                  <a:pt x="0" y="0"/>
+                </a:moveTo>
+                <a:lnTo>
+                  <a:pt x="120000" y="0"/>
+                </a:lnTo>
+                <a:lnTo>
+                  <a:pt x="120000" y="120000"/>
+                </a:lnTo>
+                <a:lnTo>
+                  <a:pt x="0" y="120000"/>
+                </a:lnTo>
+                <a:close/>
+              </a:path>
+            </a:pathLst>
+          </a:custGeom>
+        </p:spPr>
+      </p:sp>
+      <p:sp>
+        <p:nvSpPr>
+          <p:cNvPr id="218" name="Google Shape;218;g4e69c96881_0_25:notes"/>
           <p:cNvSpPr txBox="1"/>
           <p:nvPr>
             <p:ph idx="1" type="body"/>
@@ -1078,7 +1379,8 @@
               <a:buNone/>
             </a:pPr>
             <a:r>
-              <a:t/>
+              <a:rPr lang="en"/>
+              <a:t>Morgan</a:t>
             </a:r>
             <a:endParaRPr/>
           </a:p>
@@ -1111,7 +1413,7 @@
       </p:grpSpPr>
       <p:sp>
         <p:nvSpPr>
-          <p:cNvPr id="143" name="Google Shape;143;g4e85d3c2b3_1_0:notes"/>
+          <p:cNvPr id="143" name="Google Shape;143;g4ecbea148f_0_5:notes"/>
           <p:cNvSpPr/>
           <p:nvPr>
             <p:ph idx="2" type="sldImg"/>
@@ -1146,7 +1448,7 @@
       </p:sp>
       <p:sp>
         <p:nvSpPr>
-          <p:cNvPr id="144" name="Google Shape;144;g4e85d3c2b3_1_0:notes"/>
+          <p:cNvPr id="144" name="Google Shape;144;g4ecbea148f_0_5:notes"/>
           <p:cNvSpPr txBox="1"/>
           <p:nvPr>
             <p:ph idx="1" type="body"/>
@@ -1178,7 +1480,7 @@
             </a:pPr>
             <a:r>
               <a:rPr lang="en"/>
-              <a:t>Logan will present this slide.</a:t>
+              <a:t>We need a mail server or something to email the user if they forget a password (Patti)</a:t>
             </a:r>
             <a:endParaRPr/>
           </a:p>
@@ -1197,7 +1499,7 @@
   <p:cSld>
     <p:spTree>
       <p:nvGrpSpPr>
-        <p:cNvPr id="149" name="Shape 149"/>
+        <p:cNvPr id="148" name="Shape 148"/>
         <p:cNvGrpSpPr/>
         <p:nvPr/>
       </p:nvGrpSpPr>
@@ -1211,7 +1513,7 @@
       </p:grpSpPr>
       <p:sp>
         <p:nvSpPr>
-          <p:cNvPr id="150" name="Google Shape;150;g4ebcf7c756_0_0:notes"/>
+          <p:cNvPr id="149" name="Google Shape;149;g4ecbea148f_0_0:notes"/>
           <p:cNvSpPr/>
           <p:nvPr>
             <p:ph idx="2" type="sldImg"/>
@@ -1246,7 +1548,7 @@
       </p:sp>
       <p:sp>
         <p:nvSpPr>
-          <p:cNvPr id="151" name="Google Shape;151;g4ebcf7c756_0_0:notes"/>
+          <p:cNvPr id="150" name="Google Shape;150;g4ecbea148f_0_0:notes"/>
           <p:cNvSpPr txBox="1"/>
           <p:nvPr>
             <p:ph idx="1" type="body"/>
@@ -1277,7 +1579,8 @@
               <a:buNone/>
             </a:pPr>
             <a:r>
-              <a:t/>
+              <a:rPr lang="en"/>
+              <a:t>Oauth key, password (Patti)</a:t>
             </a:r>
             <a:endParaRPr/>
           </a:p>
@@ -1296,7 +1599,7 @@
   <p:cSld>
     <p:spTree>
       <p:nvGrpSpPr>
-        <p:cNvPr id="156" name="Shape 156"/>
+        <p:cNvPr id="154" name="Shape 154"/>
         <p:cNvGrpSpPr/>
         <p:nvPr/>
       </p:nvGrpSpPr>
@@ -1310,7 +1613,7 @@
       </p:grpSpPr>
       <p:sp>
         <p:nvSpPr>
-          <p:cNvPr id="157" name="Google Shape;157;g4ebcf7c756_0_16:notes"/>
+          <p:cNvPr id="155" name="Google Shape;155;g4f497c7c11_1_0:notes"/>
           <p:cNvSpPr/>
           <p:nvPr>
             <p:ph idx="2" type="sldImg"/>
@@ -1345,7 +1648,7 @@
       </p:sp>
       <p:sp>
         <p:nvSpPr>
-          <p:cNvPr id="158" name="Google Shape;158;g4ebcf7c756_0_16:notes"/>
+          <p:cNvPr id="156" name="Google Shape;156;g4f497c7c11_1_0:notes"/>
           <p:cNvSpPr txBox="1"/>
           <p:nvPr>
             <p:ph idx="1" type="body"/>
@@ -1376,7 +1679,8 @@
               <a:buNone/>
             </a:pPr>
             <a:r>
-              <a:t/>
+              <a:rPr lang="en"/>
+              <a:t>Preventing injects when getting query (Josh)</a:t>
             </a:r>
             <a:endParaRPr/>
           </a:p>
@@ -1395,7 +1699,7 @@
   <p:cSld>
     <p:spTree>
       <p:nvGrpSpPr>
-        <p:cNvPr id="163" name="Shape 163"/>
+        <p:cNvPr id="160" name="Shape 160"/>
         <p:cNvGrpSpPr/>
         <p:nvPr/>
       </p:nvGrpSpPr>
@@ -1409,7 +1713,7 @@
       </p:grpSpPr>
       <p:sp>
         <p:nvSpPr>
-          <p:cNvPr id="164" name="Google Shape;164;g4e69c96881_0_10:notes"/>
+          <p:cNvPr id="161" name="Google Shape;161;g4ecbea148f_1_0:notes"/>
           <p:cNvSpPr/>
           <p:nvPr>
             <p:ph idx="2" type="sldImg"/>
@@ -1444,7 +1748,7 @@
       </p:sp>
       <p:sp>
         <p:nvSpPr>
-          <p:cNvPr id="165" name="Google Shape;165;g4e69c96881_0_10:notes"/>
+          <p:cNvPr id="162" name="Google Shape;162;g4ecbea148f_1_0:notes"/>
           <p:cNvSpPr txBox="1"/>
           <p:nvPr>
             <p:ph idx="1" type="body"/>
@@ -1476,7 +1780,39 @@
             </a:pPr>
             <a:r>
               <a:rPr lang="en"/>
-              <a:t>Patti will present this slide.</a:t>
+              <a:t>Logan</a:t>
+            </a:r>
+            <a:endParaRPr/>
+          </a:p>
+          <a:p>
+            <a:pPr indent="0" lvl="0" marL="0" rtl="0" algn="l">
+              <a:spcBef>
+                <a:spcPts val="0"/>
+              </a:spcBef>
+              <a:spcAft>
+                <a:spcPts val="0"/>
+              </a:spcAft>
+              <a:buNone/>
+            </a:pPr>
+            <a:r>
+              <a:rPr lang="en"/>
+              <a:t>Massmine results are raw JSON file, using JSAN to convert massmine results.</a:t>
+            </a:r>
+            <a:endParaRPr/>
+          </a:p>
+          <a:p>
+            <a:pPr indent="0" lvl="0" marL="0" rtl="0" algn="l">
+              <a:spcBef>
+                <a:spcPts val="0"/>
+              </a:spcBef>
+              <a:spcAft>
+                <a:spcPts val="0"/>
+              </a:spcAft>
+              <a:buNone/>
+            </a:pPr>
+            <a:r>
+              <a:rPr lang="en"/>
+              <a:t>Retrieving nested data fields within JSON file.</a:t>
             </a:r>
             <a:endParaRPr/>
           </a:p>
@@ -1495,7 +1831,7 @@
   <p:cSld>
     <p:spTree>
       <p:nvGrpSpPr>
-        <p:cNvPr id="169" name="Shape 169"/>
+        <p:cNvPr id="167" name="Shape 167"/>
         <p:cNvGrpSpPr/>
         <p:nvPr/>
       </p:nvGrpSpPr>
@@ -1509,7 +1845,7 @@
       </p:grpSpPr>
       <p:sp>
         <p:nvSpPr>
-          <p:cNvPr id="170" name="Google Shape;170;g4ec089c641_0_0:notes"/>
+          <p:cNvPr id="168" name="Google Shape;168;g4f497c7c11_1_5:notes"/>
           <p:cNvSpPr/>
           <p:nvPr>
             <p:ph idx="2" type="sldImg"/>
@@ -1544,7 +1880,7 @@
       </p:sp>
       <p:sp>
         <p:nvSpPr>
-          <p:cNvPr id="171" name="Google Shape;171;g4ec089c641_0_0:notes"/>
+          <p:cNvPr id="169" name="Google Shape;169;g4f497c7c11_1_5:notes"/>
           <p:cNvSpPr txBox="1"/>
           <p:nvPr>
             <p:ph idx="1" type="body"/>
@@ -1576,7 +1912,7 @@
             </a:pPr>
             <a:r>
               <a:rPr lang="en"/>
-              <a:t>This is a major obstacle for database management</a:t>
+              <a:t>Morgan</a:t>
             </a:r>
             <a:endParaRPr/>
           </a:p>
@@ -1595,7 +1931,7 @@
   <p:cSld>
     <p:spTree>
       <p:nvGrpSpPr>
-        <p:cNvPr id="176" name="Shape 176"/>
+        <p:cNvPr id="173" name="Shape 173"/>
         <p:cNvGrpSpPr/>
         <p:nvPr/>
       </p:nvGrpSpPr>
@@ -1609,7 +1945,7 @@
       </p:grpSpPr>
       <p:sp>
         <p:nvSpPr>
-          <p:cNvPr id="177" name="Google Shape;177;g4e9aba5072_0_5:notes"/>
+          <p:cNvPr id="174" name="Google Shape;174;g4e85d3c2b3_1_0:notes"/>
           <p:cNvSpPr/>
           <p:nvPr>
             <p:ph idx="2" type="sldImg"/>
@@ -1644,7 +1980,7 @@
       </p:sp>
       <p:sp>
         <p:nvSpPr>
-          <p:cNvPr id="178" name="Google Shape;178;g4e9aba5072_0_5:notes"/>
+          <p:cNvPr id="175" name="Google Shape;175;g4e85d3c2b3_1_0:notes"/>
           <p:cNvSpPr txBox="1"/>
           <p:nvPr>
             <p:ph idx="1" type="body"/>
@@ -1675,7 +2011,8 @@
               <a:buNone/>
             </a:pPr>
             <a:r>
-              <a:t/>
+              <a:rPr lang="en"/>
+              <a:t>Logan will present this slide.</a:t>
             </a:r>
             <a:endParaRPr/>
           </a:p>
@@ -1694,7 +2031,7 @@
   <p:cSld>
     <p:spTree>
       <p:nvGrpSpPr>
-        <p:cNvPr id="184" name="Shape 184"/>
+        <p:cNvPr id="180" name="Shape 180"/>
         <p:cNvGrpSpPr/>
         <p:nvPr/>
       </p:nvGrpSpPr>
@@ -1708,7 +2045,7 @@
       </p:grpSpPr>
       <p:sp>
         <p:nvSpPr>
-          <p:cNvPr id="185" name="Google Shape;185;g4ebcf7c756_0_8:notes"/>
+          <p:cNvPr id="181" name="Google Shape;181;g4ebcf7c756_0_0:notes"/>
           <p:cNvSpPr/>
           <p:nvPr>
             <p:ph idx="2" type="sldImg"/>
@@ -1743,7 +2080,7 @@
       </p:sp>
       <p:sp>
         <p:nvSpPr>
-          <p:cNvPr id="186" name="Google Shape;186;g4ebcf7c756_0_8:notes"/>
+          <p:cNvPr id="182" name="Google Shape;182;g4ebcf7c756_0_0:notes"/>
           <p:cNvSpPr txBox="1"/>
           <p:nvPr>
             <p:ph idx="1" type="body"/>
@@ -1774,7 +2111,8 @@
               <a:buNone/>
             </a:pPr>
             <a:r>
-              <a:t/>
+              <a:rPr lang="en"/>
+              <a:t>Logan</a:t>
             </a:r>
             <a:endParaRPr/>
           </a:p>
@@ -10054,7 +10392,7 @@
   <p:cSld>
     <p:spTree>
       <p:nvGrpSpPr>
-        <p:cNvPr id="195" name="Shape 195"/>
+        <p:cNvPr id="190" name="Shape 190"/>
         <p:cNvGrpSpPr/>
         <p:nvPr/>
       </p:nvGrpSpPr>
@@ -10068,7 +10406,7 @@
       </p:grpSpPr>
       <p:sp>
         <p:nvSpPr>
-          <p:cNvPr id="196" name="Google Shape;196;p22"/>
+          <p:cNvPr id="191" name="Google Shape;191;p22"/>
           <p:cNvSpPr txBox="1"/>
           <p:nvPr>
             <p:ph type="title"/>
@@ -10100,6 +10438,460 @@
             </a:pPr>
             <a:r>
               <a:rPr lang="en"/>
+              <a:t>Massmine connection</a:t>
+            </a:r>
+            <a:endParaRPr/>
+          </a:p>
+        </p:txBody>
+      </p:sp>
+      <p:sp>
+        <p:nvSpPr>
+          <p:cNvPr id="192" name="Google Shape;192;p22"/>
+          <p:cNvSpPr txBox="1"/>
+          <p:nvPr>
+            <p:ph idx="1" type="body"/>
+          </p:nvPr>
+        </p:nvSpPr>
+        <p:spPr>
+          <a:xfrm>
+            <a:off x="1297500" y="1567550"/>
+            <a:ext cx="7038900" cy="2911200"/>
+          </a:xfrm>
+          <a:prstGeom prst="rect">
+            <a:avLst/>
+          </a:prstGeom>
+        </p:spPr>
+        <p:txBody>
+          <a:bodyPr anchorCtr="0" anchor="t" bIns="91425" lIns="91425" spcFirstLastPara="1" rIns="91425" wrap="square" tIns="91425">
+            <a:noAutofit/>
+          </a:bodyPr>
+          <a:lstStyle/>
+          <a:p>
+            <a:pPr indent="0" lvl="0" marL="0" rtl="0" algn="l">
+              <a:spcBef>
+                <a:spcPts val="0"/>
+              </a:spcBef>
+              <a:spcAft>
+                <a:spcPts val="1600"/>
+              </a:spcAft>
+              <a:buNone/>
+            </a:pPr>
+            <a:r>
+              <a:t/>
+            </a:r>
+            <a:endParaRPr/>
+          </a:p>
+        </p:txBody>
+      </p:sp>
+      <p:pic>
+        <p:nvPicPr>
+          <p:cNvPr id="193" name="Google Shape;193;p22"/>
+          <p:cNvPicPr preferRelativeResize="0"/>
+          <p:nvPr/>
+        </p:nvPicPr>
+        <p:blipFill>
+          <a:blip r:embed="rId3">
+            <a:alphaModFix/>
+          </a:blip>
+          <a:stretch>
+            <a:fillRect/>
+          </a:stretch>
+        </p:blipFill>
+        <p:spPr>
+          <a:xfrm>
+            <a:off x="723075" y="968125"/>
+            <a:ext cx="8038300" cy="3717700"/>
+          </a:xfrm>
+          <a:prstGeom prst="rect">
+            <a:avLst/>
+          </a:prstGeom>
+          <a:noFill/>
+          <a:ln>
+            <a:noFill/>
+          </a:ln>
+        </p:spPr>
+      </p:pic>
+    </p:spTree>
+  </p:cSld>
+  <p:clrMapOvr>
+    <a:masterClrMapping/>
+  </p:clrMapOvr>
+</p:sld>
+</file>
+
+<file path=ppt/slides/slide11.xml><?xml version="1.0" encoding="utf-8"?>
+<p:sld xmlns:a="http://schemas.openxmlformats.org/drawingml/2006/main" xmlns:r="http://schemas.openxmlformats.org/officeDocument/2006/relationships" xmlns:mc="http://schemas.openxmlformats.org/markup-compatibility/2006" xmlns:mv="urn:schemas-microsoft-com:mac:vml" xmlns:p="http://schemas.openxmlformats.org/presentationml/2006/main" xmlns:c="http://schemas.openxmlformats.org/drawingml/2006/chart" xmlns:dgm="http://schemas.openxmlformats.org/drawingml/2006/diagram" xmlns:o="urn:schemas-microsoft-com:office:office" xmlns:v="urn:schemas-microsoft-com:vml" xmlns:pvml="urn:schemas-microsoft-com:office:powerpoint" xmlns:com="http://schemas.openxmlformats.org/drawingml/2006/compatibility" xmlns:p14="http://schemas.microsoft.com/office/powerpoint/2010/main" xmlns:p15="http://schemas.microsoft.com/office/powerpoint/2012/main">
+  <p:cSld>
+    <p:spTree>
+      <p:nvGrpSpPr>
+        <p:cNvPr id="197" name="Shape 197"/>
+        <p:cNvGrpSpPr/>
+        <p:nvPr/>
+      </p:nvGrpSpPr>
+      <p:grpSpPr>
+        <a:xfrm>
+          <a:off x="0" y="0"/>
+          <a:ext cx="0" cy="0"/>
+          <a:chOff x="0" y="0"/>
+          <a:chExt cx="0" cy="0"/>
+        </a:xfrm>
+      </p:grpSpPr>
+      <p:sp>
+        <p:nvSpPr>
+          <p:cNvPr id="198" name="Google Shape;198;p23"/>
+          <p:cNvSpPr txBox="1"/>
+          <p:nvPr>
+            <p:ph type="title"/>
+          </p:nvPr>
+        </p:nvSpPr>
+        <p:spPr>
+          <a:xfrm>
+            <a:off x="1173900" y="400975"/>
+            <a:ext cx="7038900" cy="914100"/>
+          </a:xfrm>
+          <a:prstGeom prst="rect">
+            <a:avLst/>
+          </a:prstGeom>
+        </p:spPr>
+        <p:txBody>
+          <a:bodyPr anchorCtr="0" anchor="t" bIns="91425" lIns="91425" spcFirstLastPara="1" rIns="91425" wrap="square" tIns="91425">
+            <a:noAutofit/>
+          </a:bodyPr>
+          <a:lstStyle/>
+          <a:p>
+            <a:pPr indent="0" lvl="0" marL="0" rtl="0" algn="l">
+              <a:spcBef>
+                <a:spcPts val="0"/>
+              </a:spcBef>
+              <a:spcAft>
+                <a:spcPts val="0"/>
+              </a:spcAft>
+              <a:buNone/>
+            </a:pPr>
+            <a:r>
+              <a:rPr lang="en"/>
+              <a:t>Scrum Update: Feb 5</a:t>
+            </a:r>
+            <a:endParaRPr/>
+          </a:p>
+        </p:txBody>
+      </p:sp>
+      <p:sp>
+        <p:nvSpPr>
+          <p:cNvPr id="199" name="Google Shape;199;p23"/>
+          <p:cNvSpPr txBox="1"/>
+          <p:nvPr>
+            <p:ph idx="1" type="body"/>
+          </p:nvPr>
+        </p:nvSpPr>
+        <p:spPr>
+          <a:xfrm>
+            <a:off x="5900138" y="3361950"/>
+            <a:ext cx="2299200" cy="2911200"/>
+          </a:xfrm>
+          <a:prstGeom prst="rect">
+            <a:avLst/>
+          </a:prstGeom>
+        </p:spPr>
+        <p:txBody>
+          <a:bodyPr anchorCtr="0" anchor="t" bIns="91425" lIns="91425" spcFirstLastPara="1" rIns="91425" wrap="square" tIns="91425">
+            <a:noAutofit/>
+          </a:bodyPr>
+          <a:lstStyle/>
+          <a:p>
+            <a:pPr indent="0" lvl="0" marL="0" rtl="0" algn="l">
+              <a:spcBef>
+                <a:spcPts val="0"/>
+              </a:spcBef>
+              <a:spcAft>
+                <a:spcPts val="1600"/>
+              </a:spcAft>
+              <a:buNone/>
+            </a:pPr>
+            <a:r>
+              <a:rPr lang="en"/>
+              <a:t>Sprint past week: On target!</a:t>
+            </a:r>
+            <a:endParaRPr/>
+          </a:p>
+        </p:txBody>
+      </p:sp>
+      <p:pic>
+        <p:nvPicPr>
+          <p:cNvPr id="200" name="Google Shape;200;p23"/>
+          <p:cNvPicPr preferRelativeResize="0"/>
+          <p:nvPr/>
+        </p:nvPicPr>
+        <p:blipFill>
+          <a:blip r:embed="rId3">
+            <a:alphaModFix/>
+          </a:blip>
+          <a:stretch>
+            <a:fillRect/>
+          </a:stretch>
+        </p:blipFill>
+        <p:spPr>
+          <a:xfrm>
+            <a:off x="583875" y="1238625"/>
+            <a:ext cx="4850650" cy="3407224"/>
+          </a:xfrm>
+          <a:prstGeom prst="rect">
+            <a:avLst/>
+          </a:prstGeom>
+          <a:noFill/>
+          <a:ln>
+            <a:noFill/>
+          </a:ln>
+        </p:spPr>
+      </p:pic>
+      <p:pic>
+        <p:nvPicPr>
+          <p:cNvPr id="201" name="Google Shape;201;p23"/>
+          <p:cNvPicPr preferRelativeResize="0"/>
+          <p:nvPr/>
+        </p:nvPicPr>
+        <p:blipFill>
+          <a:blip r:embed="rId4">
+            <a:alphaModFix/>
+          </a:blip>
+          <a:stretch>
+            <a:fillRect/>
+          </a:stretch>
+        </p:blipFill>
+        <p:spPr>
+          <a:xfrm>
+            <a:off x="4569575" y="780500"/>
+            <a:ext cx="4286249" cy="2128150"/>
+          </a:xfrm>
+          <a:prstGeom prst="rect">
+            <a:avLst/>
+          </a:prstGeom>
+          <a:noFill/>
+          <a:ln>
+            <a:noFill/>
+          </a:ln>
+        </p:spPr>
+      </p:pic>
+    </p:spTree>
+  </p:cSld>
+  <p:clrMapOvr>
+    <a:masterClrMapping/>
+  </p:clrMapOvr>
+</p:sld>
+</file>
+
+<file path=ppt/slides/slide12.xml><?xml version="1.0" encoding="utf-8"?>
+<p:sld xmlns:a="http://schemas.openxmlformats.org/drawingml/2006/main" xmlns:r="http://schemas.openxmlformats.org/officeDocument/2006/relationships" xmlns:mc="http://schemas.openxmlformats.org/markup-compatibility/2006" xmlns:mv="urn:schemas-microsoft-com:mac:vml" xmlns:p="http://schemas.openxmlformats.org/presentationml/2006/main" xmlns:c="http://schemas.openxmlformats.org/drawingml/2006/chart" xmlns:dgm="http://schemas.openxmlformats.org/drawingml/2006/diagram" xmlns:o="urn:schemas-microsoft-com:office:office" xmlns:v="urn:schemas-microsoft-com:vml" xmlns:pvml="urn:schemas-microsoft-com:office:powerpoint" xmlns:com="http://schemas.openxmlformats.org/drawingml/2006/compatibility" xmlns:p14="http://schemas.microsoft.com/office/powerpoint/2010/main" xmlns:p15="http://schemas.microsoft.com/office/powerpoint/2012/main">
+  <p:cSld>
+    <p:spTree>
+      <p:nvGrpSpPr>
+        <p:cNvPr id="205" name="Shape 205"/>
+        <p:cNvGrpSpPr/>
+        <p:nvPr/>
+      </p:nvGrpSpPr>
+      <p:grpSpPr>
+        <a:xfrm>
+          <a:off x="0" y="0"/>
+          <a:ext cx="0" cy="0"/>
+          <a:chOff x="0" y="0"/>
+          <a:chExt cx="0" cy="0"/>
+        </a:xfrm>
+      </p:grpSpPr>
+      <p:sp>
+        <p:nvSpPr>
+          <p:cNvPr id="206" name="Google Shape;206;p24"/>
+          <p:cNvSpPr txBox="1"/>
+          <p:nvPr>
+            <p:ph type="title"/>
+          </p:nvPr>
+        </p:nvSpPr>
+        <p:spPr>
+          <a:xfrm>
+            <a:off x="1115900" y="362900"/>
+            <a:ext cx="7038900" cy="914100"/>
+          </a:xfrm>
+          <a:prstGeom prst="rect">
+            <a:avLst/>
+          </a:prstGeom>
+        </p:spPr>
+        <p:txBody>
+          <a:bodyPr anchorCtr="0" anchor="t" bIns="91425" lIns="91425" spcFirstLastPara="1" rIns="91425" wrap="square" tIns="91425">
+            <a:noAutofit/>
+          </a:bodyPr>
+          <a:lstStyle/>
+          <a:p>
+            <a:pPr indent="0" lvl="0" marL="0" rtl="0" algn="l">
+              <a:spcBef>
+                <a:spcPts val="0"/>
+              </a:spcBef>
+              <a:spcAft>
+                <a:spcPts val="0"/>
+              </a:spcAft>
+              <a:buNone/>
+            </a:pPr>
+            <a:r>
+              <a:rPr lang="en"/>
+              <a:t>Backlog: Feb. 05</a:t>
+            </a:r>
+            <a:endParaRPr/>
+          </a:p>
+        </p:txBody>
+      </p:sp>
+      <p:sp>
+        <p:nvSpPr>
+          <p:cNvPr id="207" name="Google Shape;207;p24"/>
+          <p:cNvSpPr txBox="1"/>
+          <p:nvPr>
+            <p:ph idx="1" type="body"/>
+          </p:nvPr>
+        </p:nvSpPr>
+        <p:spPr>
+          <a:xfrm>
+            <a:off x="1300425" y="3799500"/>
+            <a:ext cx="2648100" cy="537600"/>
+          </a:xfrm>
+          <a:prstGeom prst="rect">
+            <a:avLst/>
+          </a:prstGeom>
+        </p:spPr>
+        <p:txBody>
+          <a:bodyPr anchorCtr="0" anchor="t" bIns="91425" lIns="91425" spcFirstLastPara="1" rIns="91425" wrap="square" tIns="91425">
+            <a:noAutofit/>
+          </a:bodyPr>
+          <a:lstStyle/>
+          <a:p>
+            <a:pPr indent="0" lvl="0" marL="0" rtl="0" algn="l">
+              <a:spcBef>
+                <a:spcPts val="0"/>
+              </a:spcBef>
+              <a:spcAft>
+                <a:spcPts val="1600"/>
+              </a:spcAft>
+              <a:buNone/>
+            </a:pPr>
+            <a:r>
+              <a:rPr lang="en"/>
+              <a:t>We have a lot to do...</a:t>
+            </a:r>
+            <a:endParaRPr/>
+          </a:p>
+        </p:txBody>
+      </p:sp>
+      <p:pic>
+        <p:nvPicPr>
+          <p:cNvPr id="208" name="Google Shape;208;p24"/>
+          <p:cNvPicPr preferRelativeResize="0"/>
+          <p:nvPr/>
+        </p:nvPicPr>
+        <p:blipFill>
+          <a:blip r:embed="rId3">
+            <a:alphaModFix/>
+          </a:blip>
+          <a:stretch>
+            <a:fillRect/>
+          </a:stretch>
+        </p:blipFill>
+        <p:spPr>
+          <a:xfrm>
+            <a:off x="4667625" y="1807575"/>
+            <a:ext cx="3705150" cy="2972800"/>
+          </a:xfrm>
+          <a:prstGeom prst="rect">
+            <a:avLst/>
+          </a:prstGeom>
+          <a:noFill/>
+          <a:ln>
+            <a:noFill/>
+          </a:ln>
+        </p:spPr>
+      </p:pic>
+      <p:pic>
+        <p:nvPicPr>
+          <p:cNvPr id="209" name="Google Shape;209;p24"/>
+          <p:cNvPicPr preferRelativeResize="0"/>
+          <p:nvPr/>
+        </p:nvPicPr>
+        <p:blipFill>
+          <a:blip r:embed="rId4">
+            <a:alphaModFix/>
+          </a:blip>
+          <a:stretch>
+            <a:fillRect/>
+          </a:stretch>
+        </p:blipFill>
+        <p:spPr>
+          <a:xfrm>
+            <a:off x="1065050" y="1099025"/>
+            <a:ext cx="4959300" cy="2111275"/>
+          </a:xfrm>
+          <a:prstGeom prst="rect">
+            <a:avLst/>
+          </a:prstGeom>
+          <a:noFill/>
+          <a:ln>
+            <a:noFill/>
+          </a:ln>
+        </p:spPr>
+      </p:pic>
+    </p:spTree>
+  </p:cSld>
+  <p:clrMapOvr>
+    <a:masterClrMapping/>
+  </p:clrMapOvr>
+</p:sld>
+</file>
+
+<file path=ppt/slides/slide13.xml><?xml version="1.0" encoding="utf-8"?>
+<p:sld xmlns:a="http://schemas.openxmlformats.org/drawingml/2006/main" xmlns:r="http://schemas.openxmlformats.org/officeDocument/2006/relationships" xmlns:mc="http://schemas.openxmlformats.org/markup-compatibility/2006" xmlns:mv="urn:schemas-microsoft-com:mac:vml" xmlns:p="http://schemas.openxmlformats.org/presentationml/2006/main" xmlns:c="http://schemas.openxmlformats.org/drawingml/2006/chart" xmlns:dgm="http://schemas.openxmlformats.org/drawingml/2006/diagram" xmlns:o="urn:schemas-microsoft-com:office:office" xmlns:v="urn:schemas-microsoft-com:vml" xmlns:pvml="urn:schemas-microsoft-com:office:powerpoint" xmlns:com="http://schemas.openxmlformats.org/drawingml/2006/compatibility" xmlns:p14="http://schemas.microsoft.com/office/powerpoint/2010/main" xmlns:p15="http://schemas.microsoft.com/office/powerpoint/2012/main">
+  <p:cSld>
+    <p:spTree>
+      <p:nvGrpSpPr>
+        <p:cNvPr id="213" name="Shape 213"/>
+        <p:cNvGrpSpPr/>
+        <p:nvPr/>
+      </p:nvGrpSpPr>
+      <p:grpSpPr>
+        <a:xfrm>
+          <a:off x="0" y="0"/>
+          <a:ext cx="0" cy="0"/>
+          <a:chOff x="0" y="0"/>
+          <a:chExt cx="0" cy="0"/>
+        </a:xfrm>
+      </p:grpSpPr>
+      <p:sp>
+        <p:nvSpPr>
+          <p:cNvPr id="214" name="Google Shape;214;p25"/>
+          <p:cNvSpPr txBox="1"/>
+          <p:nvPr>
+            <p:ph type="title"/>
+          </p:nvPr>
+        </p:nvSpPr>
+        <p:spPr>
+          <a:xfrm>
+            <a:off x="1297500" y="393750"/>
+            <a:ext cx="7038900" cy="914100"/>
+          </a:xfrm>
+          <a:prstGeom prst="rect">
+            <a:avLst/>
+          </a:prstGeom>
+        </p:spPr>
+        <p:txBody>
+          <a:bodyPr anchorCtr="0" anchor="t" bIns="91425" lIns="91425" spcFirstLastPara="1" rIns="91425" wrap="square" tIns="91425">
+            <a:noAutofit/>
+          </a:bodyPr>
+          <a:lstStyle/>
+          <a:p>
+            <a:pPr indent="0" lvl="0" marL="0" rtl="0" algn="l">
+              <a:spcBef>
+                <a:spcPts val="0"/>
+              </a:spcBef>
+              <a:spcAft>
+                <a:spcPts val="0"/>
+              </a:spcAft>
+              <a:buNone/>
+            </a:pPr>
+            <a:r>
+              <a:rPr lang="en"/>
               <a:t>Here’s what we’ve done...</a:t>
             </a:r>
             <a:endParaRPr/>
@@ -10108,7 +10900,7 @@
       </p:sp>
       <p:sp>
         <p:nvSpPr>
-          <p:cNvPr id="197" name="Google Shape;197;p22"/>
+          <p:cNvPr id="215" name="Google Shape;215;p25"/>
           <p:cNvSpPr txBox="1"/>
           <p:nvPr>
             <p:ph idx="1" type="body"/>
@@ -10210,12 +11002,12 @@
 </p:sld>
 </file>
 
-<file path=ppt/slides/slide11.xml><?xml version="1.0" encoding="utf-8"?>
+<file path=ppt/slides/slide14.xml><?xml version="1.0" encoding="utf-8"?>
 <p:sld xmlns:a="http://schemas.openxmlformats.org/drawingml/2006/main" xmlns:r="http://schemas.openxmlformats.org/officeDocument/2006/relationships" xmlns:mc="http://schemas.openxmlformats.org/markup-compatibility/2006" xmlns:mv="urn:schemas-microsoft-com:mac:vml" xmlns:p="http://schemas.openxmlformats.org/presentationml/2006/main" xmlns:c="http://schemas.openxmlformats.org/drawingml/2006/chart" xmlns:dgm="http://schemas.openxmlformats.org/drawingml/2006/diagram" xmlns:o="urn:schemas-microsoft-com:office:office" xmlns:v="urn:schemas-microsoft-com:vml" xmlns:pvml="urn:schemas-microsoft-com:office:powerpoint" xmlns:com="http://schemas.openxmlformats.org/drawingml/2006/compatibility" xmlns:p14="http://schemas.microsoft.com/office/powerpoint/2010/main" xmlns:p15="http://schemas.microsoft.com/office/powerpoint/2012/main">
   <p:cSld>
     <p:spTree>
       <p:nvGrpSpPr>
-        <p:cNvPr id="201" name="Shape 201"/>
+        <p:cNvPr id="219" name="Shape 219"/>
         <p:cNvGrpSpPr/>
         <p:nvPr/>
       </p:nvGrpSpPr>
@@ -10229,7 +11021,7 @@
       </p:grpSpPr>
       <p:sp>
         <p:nvSpPr>
-          <p:cNvPr id="202" name="Google Shape;202;p23"/>
+          <p:cNvPr id="220" name="Google Shape;220;p26"/>
           <p:cNvSpPr txBox="1"/>
           <p:nvPr>
             <p:ph type="title"/>
@@ -10269,7 +11061,7 @@
       </p:sp>
       <p:sp>
         <p:nvSpPr>
-          <p:cNvPr id="203" name="Google Shape;203;p23"/>
+          <p:cNvPr id="221" name="Google Shape;221;p26"/>
           <p:cNvSpPr txBox="1"/>
           <p:nvPr>
             <p:ph idx="1" type="body"/>
@@ -10533,6 +11325,37 @@
               <a:spcAft>
                 <a:spcPts val="0"/>
               </a:spcAft>
+              <a:buSzPts val="1800"/>
+              <a:buFont typeface="Montserrat"/>
+              <a:buChar char="■"/>
+            </a:pPr>
+            <a:r>
+              <a:rPr lang="en" sz="1800">
+                <a:latin typeface="Montserrat"/>
+                <a:ea typeface="Montserrat"/>
+                <a:cs typeface="Montserrat"/>
+                <a:sym typeface="Montserrat"/>
+              </a:rPr>
+              <a:t>Create and update new users</a:t>
+            </a:r>
+            <a:endParaRPr sz="1800">
+              <a:solidFill>
+                <a:srgbClr val="FFFFFF"/>
+              </a:solidFill>
+              <a:latin typeface="Montserrat"/>
+              <a:ea typeface="Montserrat"/>
+              <a:cs typeface="Montserrat"/>
+              <a:sym typeface="Montserrat"/>
+            </a:endParaRPr>
+          </a:p>
+          <a:p>
+            <a:pPr indent="-342900" lvl="2" marL="1828800" rtl="0" algn="l">
+              <a:spcBef>
+                <a:spcPts val="0"/>
+              </a:spcBef>
+              <a:spcAft>
+                <a:spcPts val="0"/>
+              </a:spcAft>
               <a:buClr>
                 <a:srgbClr val="FFFFFF"/>
               </a:buClr>
@@ -10587,7 +11410,65 @@
                 <a:cs typeface="Montserrat"/>
                 <a:sym typeface="Montserrat"/>
               </a:rPr>
-              <a:t> Store collected Twitter data</a:t>
+              <a:t>Allow multiple users to </a:t>
+            </a:r>
+            <a:r>
+              <a:rPr lang="en" sz="1800">
+                <a:solidFill>
+                  <a:srgbClr val="FFFFFF"/>
+                </a:solidFill>
+                <a:latin typeface="Montserrat"/>
+                <a:ea typeface="Montserrat"/>
+                <a:cs typeface="Montserrat"/>
+                <a:sym typeface="Montserrat"/>
+              </a:rPr>
+              <a:t>simultaneously</a:t>
+            </a:r>
+            <a:r>
+              <a:rPr lang="en" sz="1800">
+                <a:solidFill>
+                  <a:srgbClr val="FFFFFF"/>
+                </a:solidFill>
+                <a:latin typeface="Montserrat"/>
+                <a:ea typeface="Montserrat"/>
+                <a:cs typeface="Montserrat"/>
+                <a:sym typeface="Montserrat"/>
+              </a:rPr>
+              <a:t> gather Twitter data. The mass of data collected by a query is a ‘study’ </a:t>
+            </a:r>
+            <a:endParaRPr sz="1800">
+              <a:solidFill>
+                <a:srgbClr val="FFFFFF"/>
+              </a:solidFill>
+              <a:latin typeface="Montserrat"/>
+              <a:ea typeface="Montserrat"/>
+              <a:cs typeface="Montserrat"/>
+              <a:sym typeface="Montserrat"/>
+            </a:endParaRPr>
+          </a:p>
+          <a:p>
+            <a:pPr indent="-342900" lvl="2" marL="1828800" rtl="0" algn="l">
+              <a:spcBef>
+                <a:spcPts val="0"/>
+              </a:spcBef>
+              <a:spcAft>
+                <a:spcPts val="0"/>
+              </a:spcAft>
+              <a:buClr>
+                <a:srgbClr val="FFFFFF"/>
+              </a:buClr>
+              <a:buSzPts val="1800"/>
+              <a:buFont typeface="Montserrat"/>
+              <a:buChar char="■"/>
+            </a:pPr>
+            <a:r>
+              <a:rPr lang="en" sz="1800">
+                <a:latin typeface="Montserrat"/>
+                <a:ea typeface="Montserrat"/>
+                <a:cs typeface="Montserrat"/>
+                <a:sym typeface="Montserrat"/>
+              </a:rPr>
+              <a:t>Store collected Twitter data</a:t>
             </a:r>
             <a:endParaRPr sz="1800">
               <a:solidFill>
@@ -10624,81 +11505,7 @@
                 <a:cs typeface="Montserrat"/>
                 <a:sym typeface="Montserrat"/>
               </a:rPr>
-              <a:t>Create and update new users</a:t>
-            </a:r>
-            <a:endParaRPr sz="1800">
-              <a:solidFill>
-                <a:srgbClr val="FFFFFF"/>
-              </a:solidFill>
-              <a:latin typeface="Montserrat"/>
-              <a:ea typeface="Montserrat"/>
-              <a:cs typeface="Montserrat"/>
-              <a:sym typeface="Montserrat"/>
-            </a:endParaRPr>
-          </a:p>
-          <a:p>
-            <a:pPr indent="-342900" lvl="2" marL="1828800" rtl="0" algn="l">
-              <a:spcBef>
-                <a:spcPts val="0"/>
-              </a:spcBef>
-              <a:spcAft>
-                <a:spcPts val="0"/>
-              </a:spcAft>
-              <a:buClr>
-                <a:srgbClr val="FFFFFF"/>
-              </a:buClr>
-              <a:buSzPts val="1800"/>
-              <a:buFont typeface="Montserrat"/>
-              <a:buChar char="■"/>
-            </a:pPr>
-            <a:r>
-              <a:rPr lang="en" sz="1800">
-                <a:solidFill>
-                  <a:srgbClr val="FFFFFF"/>
-                </a:solidFill>
-                <a:latin typeface="Montserrat"/>
-                <a:ea typeface="Montserrat"/>
-                <a:cs typeface="Montserrat"/>
-                <a:sym typeface="Montserrat"/>
-              </a:rPr>
-              <a:t>Allow users to gather Twitter data. The mass of data collected by a query is a ‘study’. </a:t>
-            </a:r>
-            <a:endParaRPr sz="1800">
-              <a:solidFill>
-                <a:srgbClr val="FFFFFF"/>
-              </a:solidFill>
-              <a:latin typeface="Montserrat"/>
-              <a:ea typeface="Montserrat"/>
-              <a:cs typeface="Montserrat"/>
-              <a:sym typeface="Montserrat"/>
-            </a:endParaRPr>
-          </a:p>
-          <a:p>
-            <a:pPr indent="-342900" lvl="2" marL="1828800" rtl="0" algn="l">
-              <a:spcBef>
-                <a:spcPts val="0"/>
-              </a:spcBef>
-              <a:spcAft>
-                <a:spcPts val="0"/>
-              </a:spcAft>
-              <a:buClr>
-                <a:srgbClr val="FFFFFF"/>
-              </a:buClr>
-              <a:buSzPts val="1800"/>
-              <a:buFont typeface="Montserrat"/>
-              <a:buChar char="■"/>
-            </a:pPr>
-            <a:r>
-              <a:rPr lang="en" sz="1800">
-                <a:solidFill>
-                  <a:srgbClr val="FFFFFF"/>
-                </a:solidFill>
-                <a:latin typeface="Montserrat"/>
-                <a:ea typeface="Montserrat"/>
-                <a:cs typeface="Montserrat"/>
-                <a:sym typeface="Montserrat"/>
-              </a:rPr>
-              <a:t>Allow users to perform basic analysis on this Twitter data.</a:t>
+              <a:t>Allow users to perform basic analysis on this Twitter data</a:t>
             </a:r>
             <a:endParaRPr sz="1800">
               <a:solidFill>
@@ -10780,6 +11587,809 @@
         <p:spPr>
           <a:xfrm>
             <a:off x="1297500" y="393750"/>
+            <a:ext cx="7038900" cy="914100"/>
+          </a:xfrm>
+          <a:prstGeom prst="rect">
+            <a:avLst/>
+          </a:prstGeom>
+        </p:spPr>
+        <p:txBody>
+          <a:bodyPr anchorCtr="0" anchor="t" bIns="91425" lIns="91425" spcFirstLastPara="1" rIns="91425" wrap="square" tIns="91425">
+            <a:noAutofit/>
+          </a:bodyPr>
+          <a:lstStyle/>
+          <a:p>
+            <a:pPr indent="0" lvl="0" marL="0" rtl="0" algn="l">
+              <a:spcBef>
+                <a:spcPts val="0"/>
+              </a:spcBef>
+              <a:spcAft>
+                <a:spcPts val="0"/>
+              </a:spcAft>
+              <a:buNone/>
+            </a:pPr>
+            <a:r>
+              <a:rPr lang="en"/>
+              <a:t>Create and Update New User	</a:t>
+            </a:r>
+            <a:endParaRPr/>
+          </a:p>
+        </p:txBody>
+      </p:sp>
+      <p:sp>
+        <p:nvSpPr>
+          <p:cNvPr id="147" name="Google Shape;147;p15"/>
+          <p:cNvSpPr txBox="1"/>
+          <p:nvPr>
+            <p:ph idx="1" type="body"/>
+          </p:nvPr>
+        </p:nvSpPr>
+        <p:spPr>
+          <a:xfrm>
+            <a:off x="1297500" y="1567550"/>
+            <a:ext cx="7038900" cy="2911200"/>
+          </a:xfrm>
+          <a:prstGeom prst="rect">
+            <a:avLst/>
+          </a:prstGeom>
+        </p:spPr>
+        <p:txBody>
+          <a:bodyPr anchorCtr="0" anchor="t" bIns="91425" lIns="91425" spcFirstLastPara="1" rIns="91425" wrap="square" tIns="91425">
+            <a:noAutofit/>
+          </a:bodyPr>
+          <a:lstStyle/>
+          <a:p>
+            <a:pPr indent="0" lvl="0" marL="0" rtl="0" algn="l">
+              <a:spcBef>
+                <a:spcPts val="0"/>
+              </a:spcBef>
+              <a:spcAft>
+                <a:spcPts val="0"/>
+              </a:spcAft>
+              <a:buNone/>
+            </a:pPr>
+            <a:r>
+              <a:rPr lang="en"/>
+              <a:t>Implementation: Django framework</a:t>
+            </a:r>
+            <a:endParaRPr/>
+          </a:p>
+          <a:p>
+            <a:pPr indent="0" lvl="0" marL="0" rtl="0" algn="l">
+              <a:spcBef>
+                <a:spcPts val="1600"/>
+              </a:spcBef>
+              <a:spcAft>
+                <a:spcPts val="0"/>
+              </a:spcAft>
+              <a:buNone/>
+            </a:pPr>
+            <a:r>
+              <a:rPr lang="en"/>
+              <a:t>Challenges: </a:t>
+            </a:r>
+            <a:endParaRPr/>
+          </a:p>
+          <a:p>
+            <a:pPr indent="-311150" lvl="0" marL="457200" rtl="0" algn="l">
+              <a:spcBef>
+                <a:spcPts val="1600"/>
+              </a:spcBef>
+              <a:spcAft>
+                <a:spcPts val="0"/>
+              </a:spcAft>
+              <a:buSzPts val="1300"/>
+              <a:buChar char="-"/>
+            </a:pPr>
+            <a:r>
+              <a:rPr lang="en"/>
+              <a:t>Verifying user identity</a:t>
+            </a:r>
+            <a:endParaRPr/>
+          </a:p>
+          <a:p>
+            <a:pPr indent="-311150" lvl="0" marL="457200" rtl="0" algn="l">
+              <a:spcBef>
+                <a:spcPts val="0"/>
+              </a:spcBef>
+              <a:spcAft>
+                <a:spcPts val="0"/>
+              </a:spcAft>
+              <a:buSzPts val="1300"/>
+              <a:buChar char="-"/>
+            </a:pPr>
+            <a:r>
+              <a:rPr lang="en"/>
+              <a:t>Preventing injects</a:t>
+            </a:r>
+            <a:endParaRPr/>
+          </a:p>
+        </p:txBody>
+      </p:sp>
+    </p:spTree>
+  </p:cSld>
+  <p:clrMapOvr>
+    <a:masterClrMapping/>
+  </p:clrMapOvr>
+</p:sld>
+</file>
+
+<file path=ppt/slides/slide4.xml><?xml version="1.0" encoding="utf-8"?>
+<p:sld xmlns:a="http://schemas.openxmlformats.org/drawingml/2006/main" xmlns:r="http://schemas.openxmlformats.org/officeDocument/2006/relationships" xmlns:mc="http://schemas.openxmlformats.org/markup-compatibility/2006" xmlns:mv="urn:schemas-microsoft-com:mac:vml" xmlns:p="http://schemas.openxmlformats.org/presentationml/2006/main" xmlns:c="http://schemas.openxmlformats.org/drawingml/2006/chart" xmlns:dgm="http://schemas.openxmlformats.org/drawingml/2006/diagram" xmlns:o="urn:schemas-microsoft-com:office:office" xmlns:v="urn:schemas-microsoft-com:vml" xmlns:pvml="urn:schemas-microsoft-com:office:powerpoint" xmlns:com="http://schemas.openxmlformats.org/drawingml/2006/compatibility" xmlns:p14="http://schemas.microsoft.com/office/powerpoint/2010/main" xmlns:p15="http://schemas.microsoft.com/office/powerpoint/2012/main">
+  <p:cSld>
+    <p:spTree>
+      <p:nvGrpSpPr>
+        <p:cNvPr id="151" name="Shape 151"/>
+        <p:cNvGrpSpPr/>
+        <p:nvPr/>
+      </p:nvGrpSpPr>
+      <p:grpSpPr>
+        <a:xfrm>
+          <a:off x="0" y="0"/>
+          <a:ext cx="0" cy="0"/>
+          <a:chOff x="0" y="0"/>
+          <a:chExt cx="0" cy="0"/>
+        </a:xfrm>
+      </p:grpSpPr>
+      <p:sp>
+        <p:nvSpPr>
+          <p:cNvPr id="152" name="Google Shape;152;p16"/>
+          <p:cNvSpPr txBox="1"/>
+          <p:nvPr>
+            <p:ph type="title"/>
+          </p:nvPr>
+        </p:nvSpPr>
+        <p:spPr>
+          <a:xfrm>
+            <a:off x="1297500" y="393750"/>
+            <a:ext cx="7038900" cy="914100"/>
+          </a:xfrm>
+          <a:prstGeom prst="rect">
+            <a:avLst/>
+          </a:prstGeom>
+        </p:spPr>
+        <p:txBody>
+          <a:bodyPr anchorCtr="0" anchor="t" bIns="91425" lIns="91425" spcFirstLastPara="1" rIns="91425" wrap="square" tIns="91425">
+            <a:noAutofit/>
+          </a:bodyPr>
+          <a:lstStyle/>
+          <a:p>
+            <a:pPr indent="0" lvl="0" marL="0" rtl="0" algn="l">
+              <a:spcBef>
+                <a:spcPts val="0"/>
+              </a:spcBef>
+              <a:spcAft>
+                <a:spcPts val="0"/>
+              </a:spcAft>
+              <a:buNone/>
+            </a:pPr>
+            <a:r>
+              <a:rPr lang="en"/>
+              <a:t>Store User Information	</a:t>
+            </a:r>
+            <a:endParaRPr/>
+          </a:p>
+        </p:txBody>
+      </p:sp>
+      <p:sp>
+        <p:nvSpPr>
+          <p:cNvPr id="153" name="Google Shape;153;p16"/>
+          <p:cNvSpPr txBox="1"/>
+          <p:nvPr>
+            <p:ph idx="1" type="body"/>
+          </p:nvPr>
+        </p:nvSpPr>
+        <p:spPr>
+          <a:xfrm>
+            <a:off x="1297500" y="1567550"/>
+            <a:ext cx="7038900" cy="2911200"/>
+          </a:xfrm>
+          <a:prstGeom prst="rect">
+            <a:avLst/>
+          </a:prstGeom>
+        </p:spPr>
+        <p:txBody>
+          <a:bodyPr anchorCtr="0" anchor="t" bIns="91425" lIns="91425" spcFirstLastPara="1" rIns="91425" wrap="square" tIns="91425">
+            <a:noAutofit/>
+          </a:bodyPr>
+          <a:lstStyle/>
+          <a:p>
+            <a:pPr indent="0" lvl="0" marL="0" rtl="0" algn="l">
+              <a:spcBef>
+                <a:spcPts val="0"/>
+              </a:spcBef>
+              <a:spcAft>
+                <a:spcPts val="0"/>
+              </a:spcAft>
+              <a:buNone/>
+            </a:pPr>
+            <a:r>
+              <a:rPr lang="en"/>
+              <a:t>Implementation: MongoDB</a:t>
+            </a:r>
+            <a:endParaRPr/>
+          </a:p>
+          <a:p>
+            <a:pPr indent="0" lvl="0" marL="0" rtl="0" algn="l">
+              <a:spcBef>
+                <a:spcPts val="1600"/>
+              </a:spcBef>
+              <a:spcAft>
+                <a:spcPts val="0"/>
+              </a:spcAft>
+              <a:buNone/>
+            </a:pPr>
+            <a:r>
+              <a:rPr lang="en"/>
+              <a:t>Challenges: </a:t>
+            </a:r>
+            <a:endParaRPr/>
+          </a:p>
+          <a:p>
+            <a:pPr indent="-311150" lvl="0" marL="457200" rtl="0" algn="l">
+              <a:spcBef>
+                <a:spcPts val="1600"/>
+              </a:spcBef>
+              <a:spcAft>
+                <a:spcPts val="0"/>
+              </a:spcAft>
+              <a:buSzPts val="1300"/>
+              <a:buChar char="-"/>
+            </a:pPr>
+            <a:r>
+              <a:rPr lang="en"/>
+              <a:t>Security of sensitive information</a:t>
+            </a:r>
+            <a:endParaRPr/>
+          </a:p>
+        </p:txBody>
+      </p:sp>
+    </p:spTree>
+  </p:cSld>
+  <p:clrMapOvr>
+    <a:masterClrMapping/>
+  </p:clrMapOvr>
+</p:sld>
+</file>
+
+<file path=ppt/slides/slide5.xml><?xml version="1.0" encoding="utf-8"?>
+<p:sld xmlns:a="http://schemas.openxmlformats.org/drawingml/2006/main" xmlns:r="http://schemas.openxmlformats.org/officeDocument/2006/relationships" xmlns:mc="http://schemas.openxmlformats.org/markup-compatibility/2006" xmlns:mv="urn:schemas-microsoft-com:mac:vml" xmlns:p="http://schemas.openxmlformats.org/presentationml/2006/main" xmlns:c="http://schemas.openxmlformats.org/drawingml/2006/chart" xmlns:dgm="http://schemas.openxmlformats.org/drawingml/2006/diagram" xmlns:o="urn:schemas-microsoft-com:office:office" xmlns:v="urn:schemas-microsoft-com:vml" xmlns:pvml="urn:schemas-microsoft-com:office:powerpoint" xmlns:com="http://schemas.openxmlformats.org/drawingml/2006/compatibility" xmlns:p14="http://schemas.microsoft.com/office/powerpoint/2010/main" xmlns:p15="http://schemas.microsoft.com/office/powerpoint/2012/main">
+  <p:cSld>
+    <p:spTree>
+      <p:nvGrpSpPr>
+        <p:cNvPr id="157" name="Shape 157"/>
+        <p:cNvGrpSpPr/>
+        <p:nvPr/>
+      </p:nvGrpSpPr>
+      <p:grpSpPr>
+        <a:xfrm>
+          <a:off x="0" y="0"/>
+          <a:ext cx="0" cy="0"/>
+          <a:chOff x="0" y="0"/>
+          <a:chExt cx="0" cy="0"/>
+        </a:xfrm>
+      </p:grpSpPr>
+      <p:sp>
+        <p:nvSpPr>
+          <p:cNvPr id="158" name="Google Shape;158;p17"/>
+          <p:cNvSpPr txBox="1"/>
+          <p:nvPr>
+            <p:ph type="title"/>
+          </p:nvPr>
+        </p:nvSpPr>
+        <p:spPr>
+          <a:xfrm>
+            <a:off x="1297500" y="393750"/>
+            <a:ext cx="7038900" cy="914100"/>
+          </a:xfrm>
+          <a:prstGeom prst="rect">
+            <a:avLst/>
+          </a:prstGeom>
+        </p:spPr>
+        <p:txBody>
+          <a:bodyPr anchorCtr="0" anchor="t" bIns="91425" lIns="91425" spcFirstLastPara="1" rIns="91425" wrap="square" tIns="91425">
+            <a:noAutofit/>
+          </a:bodyPr>
+          <a:lstStyle/>
+          <a:p>
+            <a:pPr indent="0" lvl="0" marL="0" rtl="0" algn="l">
+              <a:spcBef>
+                <a:spcPts val="0"/>
+              </a:spcBef>
+              <a:spcAft>
+                <a:spcPts val="0"/>
+              </a:spcAft>
+              <a:buNone/>
+            </a:pPr>
+            <a:r>
+              <a:rPr lang="en"/>
+              <a:t>Creating a ‘study’ </a:t>
+            </a:r>
+            <a:endParaRPr/>
+          </a:p>
+        </p:txBody>
+      </p:sp>
+      <p:sp>
+        <p:nvSpPr>
+          <p:cNvPr id="159" name="Google Shape;159;p17"/>
+          <p:cNvSpPr txBox="1"/>
+          <p:nvPr>
+            <p:ph idx="1" type="body"/>
+          </p:nvPr>
+        </p:nvSpPr>
+        <p:spPr>
+          <a:xfrm>
+            <a:off x="1377425" y="1542200"/>
+            <a:ext cx="7038900" cy="2911200"/>
+          </a:xfrm>
+          <a:prstGeom prst="rect">
+            <a:avLst/>
+          </a:prstGeom>
+        </p:spPr>
+        <p:txBody>
+          <a:bodyPr anchorCtr="0" anchor="t" bIns="91425" lIns="91425" spcFirstLastPara="1" rIns="91425" wrap="square" tIns="91425">
+            <a:noAutofit/>
+          </a:bodyPr>
+          <a:lstStyle/>
+          <a:p>
+            <a:pPr indent="0" lvl="0" marL="0" rtl="0" algn="l">
+              <a:spcBef>
+                <a:spcPts val="0"/>
+              </a:spcBef>
+              <a:spcAft>
+                <a:spcPts val="0"/>
+              </a:spcAft>
+              <a:buNone/>
+            </a:pPr>
+            <a:r>
+              <a:rPr lang="en"/>
+              <a:t>Implementation: Django, MassMine</a:t>
+            </a:r>
+            <a:endParaRPr/>
+          </a:p>
+          <a:p>
+            <a:pPr indent="0" lvl="0" marL="0" rtl="0" algn="l">
+              <a:spcBef>
+                <a:spcPts val="1600"/>
+              </a:spcBef>
+              <a:spcAft>
+                <a:spcPts val="0"/>
+              </a:spcAft>
+              <a:buNone/>
+            </a:pPr>
+            <a:r>
+              <a:rPr lang="en"/>
+              <a:t>Challenges: </a:t>
+            </a:r>
+            <a:endParaRPr/>
+          </a:p>
+          <a:p>
+            <a:pPr indent="-311150" lvl="0" marL="457200" rtl="0" algn="l">
+              <a:spcBef>
+                <a:spcPts val="1600"/>
+              </a:spcBef>
+              <a:spcAft>
+                <a:spcPts val="0"/>
+              </a:spcAft>
+              <a:buSzPts val="1300"/>
+              <a:buChar char="-"/>
+            </a:pPr>
+            <a:r>
+              <a:rPr lang="en"/>
+              <a:t>MassMine socket</a:t>
+            </a:r>
+            <a:endParaRPr/>
+          </a:p>
+          <a:p>
+            <a:pPr indent="-311150" lvl="0" marL="457200" rtl="0" algn="l">
+              <a:spcBef>
+                <a:spcPts val="0"/>
+              </a:spcBef>
+              <a:spcAft>
+                <a:spcPts val="0"/>
+              </a:spcAft>
+              <a:buSzPts val="1300"/>
+              <a:buChar char="-"/>
+            </a:pPr>
+            <a:r>
+              <a:rPr lang="en"/>
+              <a:t>Getting a valid query from the user</a:t>
+            </a:r>
+            <a:endParaRPr/>
+          </a:p>
+        </p:txBody>
+      </p:sp>
+    </p:spTree>
+  </p:cSld>
+  <p:clrMapOvr>
+    <a:masterClrMapping/>
+  </p:clrMapOvr>
+</p:sld>
+</file>
+
+<file path=ppt/slides/slide6.xml><?xml version="1.0" encoding="utf-8"?>
+<p:sld xmlns:a="http://schemas.openxmlformats.org/drawingml/2006/main" xmlns:r="http://schemas.openxmlformats.org/officeDocument/2006/relationships" xmlns:mc="http://schemas.openxmlformats.org/markup-compatibility/2006" xmlns:mv="urn:schemas-microsoft-com:mac:vml" xmlns:p="http://schemas.openxmlformats.org/presentationml/2006/main" xmlns:c="http://schemas.openxmlformats.org/drawingml/2006/chart" xmlns:dgm="http://schemas.openxmlformats.org/drawingml/2006/diagram" xmlns:o="urn:schemas-microsoft-com:office:office" xmlns:v="urn:schemas-microsoft-com:vml" xmlns:pvml="urn:schemas-microsoft-com:office:powerpoint" xmlns:com="http://schemas.openxmlformats.org/drawingml/2006/compatibility" xmlns:p14="http://schemas.microsoft.com/office/powerpoint/2010/main" xmlns:p15="http://schemas.microsoft.com/office/powerpoint/2012/main">
+  <p:cSld>
+    <p:spTree>
+      <p:nvGrpSpPr>
+        <p:cNvPr id="163" name="Shape 163"/>
+        <p:cNvGrpSpPr/>
+        <p:nvPr/>
+      </p:nvGrpSpPr>
+      <p:grpSpPr>
+        <a:xfrm>
+          <a:off x="0" y="0"/>
+          <a:ext cx="0" cy="0"/>
+          <a:chOff x="0" y="0"/>
+          <a:chExt cx="0" cy="0"/>
+        </a:xfrm>
+      </p:grpSpPr>
+      <p:sp>
+        <p:nvSpPr>
+          <p:cNvPr id="164" name="Google Shape;164;p18"/>
+          <p:cNvSpPr txBox="1"/>
+          <p:nvPr>
+            <p:ph type="title"/>
+          </p:nvPr>
+        </p:nvSpPr>
+        <p:spPr>
+          <a:xfrm>
+            <a:off x="1297500" y="393750"/>
+            <a:ext cx="7038900" cy="914100"/>
+          </a:xfrm>
+          <a:prstGeom prst="rect">
+            <a:avLst/>
+          </a:prstGeom>
+        </p:spPr>
+        <p:txBody>
+          <a:bodyPr anchorCtr="0" anchor="t" bIns="91425" lIns="91425" spcFirstLastPara="1" rIns="91425" wrap="square" tIns="91425">
+            <a:noAutofit/>
+          </a:bodyPr>
+          <a:lstStyle/>
+          <a:p>
+            <a:pPr indent="0" lvl="0" marL="0" rtl="0" algn="l">
+              <a:spcBef>
+                <a:spcPts val="0"/>
+              </a:spcBef>
+              <a:spcAft>
+                <a:spcPts val="0"/>
+              </a:spcAft>
+              <a:buNone/>
+            </a:pPr>
+            <a:r>
+              <a:rPr lang="en"/>
+              <a:t>Store Collected Twitter Data</a:t>
+            </a:r>
+            <a:endParaRPr/>
+          </a:p>
+        </p:txBody>
+      </p:sp>
+      <p:sp>
+        <p:nvSpPr>
+          <p:cNvPr id="165" name="Google Shape;165;p18"/>
+          <p:cNvSpPr txBox="1"/>
+          <p:nvPr>
+            <p:ph idx="1" type="body"/>
+          </p:nvPr>
+        </p:nvSpPr>
+        <p:spPr>
+          <a:xfrm>
+            <a:off x="1297500" y="1567550"/>
+            <a:ext cx="2793000" cy="2911200"/>
+          </a:xfrm>
+          <a:prstGeom prst="rect">
+            <a:avLst/>
+          </a:prstGeom>
+        </p:spPr>
+        <p:txBody>
+          <a:bodyPr anchorCtr="0" anchor="t" bIns="91425" lIns="91425" spcFirstLastPara="1" rIns="91425" wrap="square" tIns="91425">
+            <a:noAutofit/>
+          </a:bodyPr>
+          <a:lstStyle/>
+          <a:p>
+            <a:pPr indent="0" lvl="0" marL="0" rtl="0" algn="l">
+              <a:spcBef>
+                <a:spcPts val="0"/>
+              </a:spcBef>
+              <a:spcAft>
+                <a:spcPts val="0"/>
+              </a:spcAft>
+              <a:buNone/>
+            </a:pPr>
+            <a:r>
+              <a:rPr lang="en"/>
+              <a:t>Implementation: MongoDB</a:t>
+            </a:r>
+            <a:endParaRPr/>
+          </a:p>
+          <a:p>
+            <a:pPr indent="0" lvl="0" marL="0" rtl="0" algn="l">
+              <a:spcBef>
+                <a:spcPts val="1600"/>
+              </a:spcBef>
+              <a:spcAft>
+                <a:spcPts val="0"/>
+              </a:spcAft>
+              <a:buNone/>
+            </a:pPr>
+            <a:r>
+              <a:rPr lang="en"/>
+              <a:t>Challenges: </a:t>
+            </a:r>
+            <a:endParaRPr/>
+          </a:p>
+          <a:p>
+            <a:pPr indent="-311150" lvl="0" marL="457200" rtl="0" algn="l">
+              <a:spcBef>
+                <a:spcPts val="1600"/>
+              </a:spcBef>
+              <a:spcAft>
+                <a:spcPts val="0"/>
+              </a:spcAft>
+              <a:buSzPts val="1300"/>
+              <a:buChar char="-"/>
+            </a:pPr>
+            <a:r>
+              <a:rPr lang="en"/>
+              <a:t>Parsing MassMine Results</a:t>
+            </a:r>
+            <a:endParaRPr/>
+          </a:p>
+          <a:p>
+            <a:pPr indent="-311150" lvl="0" marL="457200" rtl="0" algn="l">
+              <a:spcBef>
+                <a:spcPts val="0"/>
+              </a:spcBef>
+              <a:spcAft>
+                <a:spcPts val="0"/>
+              </a:spcAft>
+              <a:buSzPts val="1300"/>
+              <a:buChar char="-"/>
+            </a:pPr>
+            <a:r>
+              <a:rPr lang="en"/>
+              <a:t>Nested Data</a:t>
+            </a:r>
+            <a:endParaRPr/>
+          </a:p>
+        </p:txBody>
+      </p:sp>
+      <p:pic>
+        <p:nvPicPr>
+          <p:cNvPr id="166" name="Google Shape;166;p18"/>
+          <p:cNvPicPr preferRelativeResize="0"/>
+          <p:nvPr/>
+        </p:nvPicPr>
+        <p:blipFill>
+          <a:blip r:embed="rId3">
+            <a:alphaModFix/>
+          </a:blip>
+          <a:stretch>
+            <a:fillRect/>
+          </a:stretch>
+        </p:blipFill>
+        <p:spPr>
+          <a:xfrm>
+            <a:off x="4165150" y="1214125"/>
+            <a:ext cx="4578540" cy="3530850"/>
+          </a:xfrm>
+          <a:prstGeom prst="rect">
+            <a:avLst/>
+          </a:prstGeom>
+          <a:noFill/>
+          <a:ln>
+            <a:noFill/>
+          </a:ln>
+        </p:spPr>
+      </p:pic>
+    </p:spTree>
+  </p:cSld>
+  <p:clrMapOvr>
+    <a:masterClrMapping/>
+  </p:clrMapOvr>
+</p:sld>
+</file>
+
+<file path=ppt/slides/slide7.xml><?xml version="1.0" encoding="utf-8"?>
+<p:sld xmlns:a="http://schemas.openxmlformats.org/drawingml/2006/main" xmlns:r="http://schemas.openxmlformats.org/officeDocument/2006/relationships" xmlns:mc="http://schemas.openxmlformats.org/markup-compatibility/2006" xmlns:mv="urn:schemas-microsoft-com:mac:vml" xmlns:p="http://schemas.openxmlformats.org/presentationml/2006/main" xmlns:c="http://schemas.openxmlformats.org/drawingml/2006/chart" xmlns:dgm="http://schemas.openxmlformats.org/drawingml/2006/diagram" xmlns:o="urn:schemas-microsoft-com:office:office" xmlns:v="urn:schemas-microsoft-com:vml" xmlns:pvml="urn:schemas-microsoft-com:office:powerpoint" xmlns:com="http://schemas.openxmlformats.org/drawingml/2006/compatibility" xmlns:p14="http://schemas.microsoft.com/office/powerpoint/2010/main" xmlns:p15="http://schemas.microsoft.com/office/powerpoint/2012/main">
+  <p:cSld>
+    <p:spTree>
+      <p:nvGrpSpPr>
+        <p:cNvPr id="170" name="Shape 170"/>
+        <p:cNvGrpSpPr/>
+        <p:nvPr/>
+      </p:nvGrpSpPr>
+      <p:grpSpPr>
+        <a:xfrm>
+          <a:off x="0" y="0"/>
+          <a:ext cx="0" cy="0"/>
+          <a:chOff x="0" y="0"/>
+          <a:chExt cx="0" cy="0"/>
+        </a:xfrm>
+      </p:grpSpPr>
+      <p:sp>
+        <p:nvSpPr>
+          <p:cNvPr id="171" name="Google Shape;171;p19"/>
+          <p:cNvSpPr txBox="1"/>
+          <p:nvPr>
+            <p:ph type="title"/>
+          </p:nvPr>
+        </p:nvSpPr>
+        <p:spPr>
+          <a:xfrm>
+            <a:off x="1297500" y="393750"/>
+            <a:ext cx="7038900" cy="914100"/>
+          </a:xfrm>
+          <a:prstGeom prst="rect">
+            <a:avLst/>
+          </a:prstGeom>
+        </p:spPr>
+        <p:txBody>
+          <a:bodyPr anchorCtr="0" anchor="t" bIns="91425" lIns="91425" spcFirstLastPara="1" rIns="91425" wrap="square" tIns="91425">
+            <a:noAutofit/>
+          </a:bodyPr>
+          <a:lstStyle/>
+          <a:p>
+            <a:pPr indent="0" lvl="0" marL="0" rtl="0" algn="l">
+              <a:spcBef>
+                <a:spcPts val="0"/>
+              </a:spcBef>
+              <a:spcAft>
+                <a:spcPts val="0"/>
+              </a:spcAft>
+              <a:buNone/>
+            </a:pPr>
+            <a:r>
+              <a:rPr lang="en"/>
+              <a:t>Creating an ‘analysis’</a:t>
+            </a:r>
+            <a:endParaRPr/>
+          </a:p>
+        </p:txBody>
+      </p:sp>
+      <p:sp>
+        <p:nvSpPr>
+          <p:cNvPr id="172" name="Google Shape;172;p19"/>
+          <p:cNvSpPr txBox="1"/>
+          <p:nvPr>
+            <p:ph idx="1" type="body"/>
+          </p:nvPr>
+        </p:nvSpPr>
+        <p:spPr>
+          <a:xfrm>
+            <a:off x="1297500" y="1567550"/>
+            <a:ext cx="7038900" cy="2911200"/>
+          </a:xfrm>
+          <a:prstGeom prst="rect">
+            <a:avLst/>
+          </a:prstGeom>
+        </p:spPr>
+        <p:txBody>
+          <a:bodyPr anchorCtr="0" anchor="t" bIns="91425" lIns="91425" spcFirstLastPara="1" rIns="91425" wrap="square" tIns="91425">
+            <a:noAutofit/>
+          </a:bodyPr>
+          <a:lstStyle/>
+          <a:p>
+            <a:pPr indent="0" lvl="0" marL="0" rtl="0" algn="l">
+              <a:spcBef>
+                <a:spcPts val="0"/>
+              </a:spcBef>
+              <a:spcAft>
+                <a:spcPts val="0"/>
+              </a:spcAft>
+              <a:buNone/>
+            </a:pPr>
+            <a:r>
+              <a:rPr lang="en"/>
+              <a:t>Implementation: MongoDB, Django</a:t>
+            </a:r>
+            <a:endParaRPr/>
+          </a:p>
+          <a:p>
+            <a:pPr indent="0" lvl="0" marL="0" rtl="0" algn="l">
+              <a:spcBef>
+                <a:spcPts val="1600"/>
+              </a:spcBef>
+              <a:spcAft>
+                <a:spcPts val="0"/>
+              </a:spcAft>
+              <a:buNone/>
+            </a:pPr>
+            <a:r>
+              <a:rPr lang="en"/>
+              <a:t>Challenges: </a:t>
+            </a:r>
+            <a:endParaRPr/>
+          </a:p>
+          <a:p>
+            <a:pPr indent="-311150" lvl="0" marL="457200" rtl="0" algn="l">
+              <a:spcBef>
+                <a:spcPts val="1600"/>
+              </a:spcBef>
+              <a:spcAft>
+                <a:spcPts val="0"/>
+              </a:spcAft>
+              <a:buSzPts val="1300"/>
+              <a:buChar char="-"/>
+            </a:pPr>
+            <a:r>
+              <a:rPr lang="en"/>
+              <a:t>Graphical displays </a:t>
+            </a:r>
+            <a:endParaRPr/>
+          </a:p>
+          <a:p>
+            <a:pPr indent="-311150" lvl="0" marL="457200" rtl="0" algn="l">
+              <a:spcBef>
+                <a:spcPts val="0"/>
+              </a:spcBef>
+              <a:spcAft>
+                <a:spcPts val="0"/>
+              </a:spcAft>
+              <a:buSzPts val="1300"/>
+              <a:buChar char="-"/>
+            </a:pPr>
+            <a:r>
+              <a:rPr lang="en"/>
+              <a:t>Time to complete analysis </a:t>
+            </a:r>
+            <a:endParaRPr/>
+          </a:p>
+          <a:p>
+            <a:pPr indent="-311150" lvl="0" marL="457200" rtl="0" algn="l">
+              <a:spcBef>
+                <a:spcPts val="0"/>
+              </a:spcBef>
+              <a:spcAft>
+                <a:spcPts val="0"/>
+              </a:spcAft>
+              <a:buSzPts val="1300"/>
+              <a:buChar char="-"/>
+            </a:pPr>
+            <a:r>
+              <a:rPr lang="en"/>
+              <a:t>Generating pre-made useful analyses</a:t>
+            </a:r>
+            <a:endParaRPr/>
+          </a:p>
+        </p:txBody>
+      </p:sp>
+    </p:spTree>
+  </p:cSld>
+  <p:clrMapOvr>
+    <a:masterClrMapping/>
+  </p:clrMapOvr>
+</p:sld>
+</file>
+
+<file path=ppt/slides/slide8.xml><?xml version="1.0" encoding="utf-8"?>
+<p:sld xmlns:a="http://schemas.openxmlformats.org/drawingml/2006/main" xmlns:r="http://schemas.openxmlformats.org/officeDocument/2006/relationships" xmlns:mc="http://schemas.openxmlformats.org/markup-compatibility/2006" xmlns:mv="urn:schemas-microsoft-com:mac:vml" xmlns:p="http://schemas.openxmlformats.org/presentationml/2006/main" xmlns:c="http://schemas.openxmlformats.org/drawingml/2006/chart" xmlns:dgm="http://schemas.openxmlformats.org/drawingml/2006/diagram" xmlns:o="urn:schemas-microsoft-com:office:office" xmlns:v="urn:schemas-microsoft-com:vml" xmlns:pvml="urn:schemas-microsoft-com:office:powerpoint" xmlns:com="http://schemas.openxmlformats.org/drawingml/2006/compatibility" xmlns:p14="http://schemas.microsoft.com/office/powerpoint/2010/main" xmlns:p15="http://schemas.microsoft.com/office/powerpoint/2012/main">
+  <p:cSld>
+    <p:spTree>
+      <p:nvGrpSpPr>
+        <p:cNvPr id="176" name="Shape 176"/>
+        <p:cNvGrpSpPr/>
+        <p:nvPr/>
+      </p:nvGrpSpPr>
+      <p:grpSpPr>
+        <a:xfrm>
+          <a:off x="0" y="0"/>
+          <a:ext cx="0" cy="0"/>
+          <a:chOff x="0" y="0"/>
+          <a:chExt cx="0" cy="0"/>
+        </a:xfrm>
+      </p:grpSpPr>
+      <p:sp>
+        <p:nvSpPr>
+          <p:cNvPr id="177" name="Google Shape;177;p20"/>
+          <p:cNvSpPr txBox="1"/>
+          <p:nvPr>
+            <p:ph type="title"/>
+          </p:nvPr>
+        </p:nvSpPr>
+        <p:spPr>
+          <a:xfrm>
+            <a:off x="1297500" y="393750"/>
             <a:ext cx="3475500" cy="914100"/>
           </a:xfrm>
           <a:prstGeom prst="rect">
@@ -10811,7 +12421,7 @@
       </p:sp>
       <p:sp>
         <p:nvSpPr>
-          <p:cNvPr id="147" name="Google Shape;147;p15"/>
+          <p:cNvPr id="178" name="Google Shape;178;p20"/>
           <p:cNvSpPr txBox="1"/>
           <p:nvPr>
             <p:ph idx="1" type="body"/>
@@ -11022,7 +12632,7 @@
       </p:sp>
       <p:pic>
         <p:nvPicPr>
-          <p:cNvPr id="148" name="Google Shape;148;p15"/>
+          <p:cNvPr id="179" name="Google Shape;179;p20"/>
           <p:cNvPicPr preferRelativeResize="0"/>
           <p:nvPr/>
         </p:nvPicPr>
@@ -11056,12 +12666,12 @@
 </p:sld>
 </file>
 
-<file path=ppt/slides/slide4.xml><?xml version="1.0" encoding="utf-8"?>
+<file path=ppt/slides/slide9.xml><?xml version="1.0" encoding="utf-8"?>
 <p:sld xmlns:a="http://schemas.openxmlformats.org/drawingml/2006/main" xmlns:r="http://schemas.openxmlformats.org/officeDocument/2006/relationships" xmlns:mc="http://schemas.openxmlformats.org/markup-compatibility/2006" xmlns:mv="urn:schemas-microsoft-com:mac:vml" xmlns:p="http://schemas.openxmlformats.org/presentationml/2006/main" xmlns:c="http://schemas.openxmlformats.org/drawingml/2006/chart" xmlns:dgm="http://schemas.openxmlformats.org/drawingml/2006/diagram" xmlns:o="urn:schemas-microsoft-com:office:office" xmlns:v="urn:schemas-microsoft-com:vml" xmlns:pvml="urn:schemas-microsoft-com:office:powerpoint" xmlns:com="http://schemas.openxmlformats.org/drawingml/2006/compatibility" xmlns:p14="http://schemas.microsoft.com/office/powerpoint/2010/main" xmlns:p15="http://schemas.microsoft.com/office/powerpoint/2012/main">
   <p:cSld>
     <p:spTree>
       <p:nvGrpSpPr>
-        <p:cNvPr id="152" name="Shape 152"/>
+        <p:cNvPr id="183" name="Shape 183"/>
         <p:cNvGrpSpPr/>
         <p:nvPr/>
       </p:nvGrpSpPr>
@@ -11075,7 +12685,7 @@
       </p:grpSpPr>
       <p:sp>
         <p:nvSpPr>
-          <p:cNvPr id="153" name="Google Shape;153;p16"/>
+          <p:cNvPr id="184" name="Google Shape;184;p21"/>
           <p:cNvSpPr txBox="1"/>
           <p:nvPr>
             <p:ph type="title"/>
@@ -11083,7 +12693,7 @@
         </p:nvSpPr>
         <p:spPr>
           <a:xfrm>
-            <a:off x="1341100" y="290600"/>
+            <a:off x="1268000" y="305225"/>
             <a:ext cx="7038900" cy="1017300"/>
           </a:xfrm>
           <a:prstGeom prst="rect">
@@ -11115,7 +12725,7 @@
       </p:sp>
       <p:sp>
         <p:nvSpPr>
-          <p:cNvPr id="154" name="Google Shape;154;p16"/>
+          <p:cNvPr id="185" name="Google Shape;185;p21"/>
           <p:cNvSpPr txBox="1"/>
           <p:nvPr>
             <p:ph idx="1" type="body"/>
@@ -11123,8 +12733,8 @@
         </p:nvSpPr>
         <p:spPr>
           <a:xfrm>
-            <a:off x="1297500" y="1567550"/>
-            <a:ext cx="7038900" cy="2911200"/>
+            <a:off x="7082775" y="1567550"/>
+            <a:ext cx="1253700" cy="2911200"/>
           </a:xfrm>
           <a:prstGeom prst="rect">
             <a:avLst/>
@@ -11154,7 +12764,7 @@
       </p:sp>
       <p:pic>
         <p:nvPicPr>
-          <p:cNvPr id="155" name="Google Shape;155;p16"/>
+          <p:cNvPr id="186" name="Google Shape;186;p21"/>
           <p:cNvPicPr preferRelativeResize="0"/>
           <p:nvPr/>
         </p:nvPicPr>
@@ -11168,839 +12778,8 @@
         </p:blipFill>
         <p:spPr>
           <a:xfrm>
-            <a:off x="1377425" y="855975"/>
-            <a:ext cx="6091801" cy="4164051"/>
-          </a:xfrm>
-          <a:prstGeom prst="rect">
-            <a:avLst/>
-          </a:prstGeom>
-          <a:noFill/>
-          <a:ln>
-            <a:noFill/>
-          </a:ln>
-        </p:spPr>
-      </p:pic>
-    </p:spTree>
-  </p:cSld>
-  <p:clrMapOvr>
-    <a:masterClrMapping/>
-  </p:clrMapOvr>
-</p:sld>
-</file>
-
-<file path=ppt/slides/slide5.xml><?xml version="1.0" encoding="utf-8"?>
-<p:sld xmlns:a="http://schemas.openxmlformats.org/drawingml/2006/main" xmlns:r="http://schemas.openxmlformats.org/officeDocument/2006/relationships" xmlns:mc="http://schemas.openxmlformats.org/markup-compatibility/2006" xmlns:mv="urn:schemas-microsoft-com:mac:vml" xmlns:p="http://schemas.openxmlformats.org/presentationml/2006/main" xmlns:c="http://schemas.openxmlformats.org/drawingml/2006/chart" xmlns:dgm="http://schemas.openxmlformats.org/drawingml/2006/diagram" xmlns:o="urn:schemas-microsoft-com:office:office" xmlns:v="urn:schemas-microsoft-com:vml" xmlns:pvml="urn:schemas-microsoft-com:office:powerpoint" xmlns:com="http://schemas.openxmlformats.org/drawingml/2006/compatibility" xmlns:p14="http://schemas.microsoft.com/office/powerpoint/2010/main" xmlns:p15="http://schemas.microsoft.com/office/powerpoint/2012/main">
-  <p:cSld>
-    <p:spTree>
-      <p:nvGrpSpPr>
-        <p:cNvPr id="159" name="Shape 159"/>
-        <p:cNvGrpSpPr/>
-        <p:nvPr/>
-      </p:nvGrpSpPr>
-      <p:grpSpPr>
-        <a:xfrm>
-          <a:off x="0" y="0"/>
-          <a:ext cx="0" cy="0"/>
-          <a:chOff x="0" y="0"/>
-          <a:chExt cx="0" cy="0"/>
-        </a:xfrm>
-      </p:grpSpPr>
-      <p:sp>
-        <p:nvSpPr>
-          <p:cNvPr id="160" name="Google Shape;160;p17"/>
-          <p:cNvSpPr txBox="1"/>
-          <p:nvPr>
-            <p:ph type="title"/>
-          </p:nvPr>
-        </p:nvSpPr>
-        <p:spPr>
-          <a:xfrm>
-            <a:off x="1297500" y="393750"/>
-            <a:ext cx="7038900" cy="914100"/>
-          </a:xfrm>
-          <a:prstGeom prst="rect">
-            <a:avLst/>
-          </a:prstGeom>
-        </p:spPr>
-        <p:txBody>
-          <a:bodyPr anchorCtr="0" anchor="t" bIns="91425" lIns="91425" spcFirstLastPara="1" rIns="91425" wrap="square" tIns="91425">
-            <a:noAutofit/>
-          </a:bodyPr>
-          <a:lstStyle/>
-          <a:p>
-            <a:pPr indent="0" lvl="0" marL="0" rtl="0" algn="l">
-              <a:spcBef>
-                <a:spcPts val="0"/>
-              </a:spcBef>
-              <a:spcAft>
-                <a:spcPts val="0"/>
-              </a:spcAft>
-              <a:buNone/>
-            </a:pPr>
-            <a:r>
-              <a:rPr lang="en"/>
-              <a:t>Massmine connection</a:t>
-            </a:r>
-            <a:endParaRPr/>
-          </a:p>
-        </p:txBody>
-      </p:sp>
-      <p:sp>
-        <p:nvSpPr>
-          <p:cNvPr id="161" name="Google Shape;161;p17"/>
-          <p:cNvSpPr txBox="1"/>
-          <p:nvPr>
-            <p:ph idx="1" type="body"/>
-          </p:nvPr>
-        </p:nvSpPr>
-        <p:spPr>
-          <a:xfrm>
-            <a:off x="1297500" y="1567550"/>
-            <a:ext cx="7038900" cy="2911200"/>
-          </a:xfrm>
-          <a:prstGeom prst="rect">
-            <a:avLst/>
-          </a:prstGeom>
-        </p:spPr>
-        <p:txBody>
-          <a:bodyPr anchorCtr="0" anchor="t" bIns="91425" lIns="91425" spcFirstLastPara="1" rIns="91425" wrap="square" tIns="91425">
-            <a:noAutofit/>
-          </a:bodyPr>
-          <a:lstStyle/>
-          <a:p>
-            <a:pPr indent="0" lvl="0" marL="0" rtl="0" algn="l">
-              <a:spcBef>
-                <a:spcPts val="0"/>
-              </a:spcBef>
-              <a:spcAft>
-                <a:spcPts val="1600"/>
-              </a:spcAft>
-              <a:buNone/>
-            </a:pPr>
-            <a:r>
-              <a:t/>
-            </a:r>
-            <a:endParaRPr/>
-          </a:p>
-        </p:txBody>
-      </p:sp>
-      <p:pic>
-        <p:nvPicPr>
-          <p:cNvPr id="162" name="Google Shape;162;p17"/>
-          <p:cNvPicPr preferRelativeResize="0"/>
-          <p:nvPr/>
-        </p:nvPicPr>
-        <p:blipFill>
-          <a:blip r:embed="rId3">
-            <a:alphaModFix/>
-          </a:blip>
-          <a:stretch>
-            <a:fillRect/>
-          </a:stretch>
-        </p:blipFill>
-        <p:spPr>
-          <a:xfrm>
-            <a:off x="723075" y="968125"/>
-            <a:ext cx="8038300" cy="3717700"/>
-          </a:xfrm>
-          <a:prstGeom prst="rect">
-            <a:avLst/>
-          </a:prstGeom>
-          <a:noFill/>
-          <a:ln>
-            <a:noFill/>
-          </a:ln>
-        </p:spPr>
-      </p:pic>
-    </p:spTree>
-  </p:cSld>
-  <p:clrMapOvr>
-    <a:masterClrMapping/>
-  </p:clrMapOvr>
-</p:sld>
-</file>
-
-<file path=ppt/slides/slide6.xml><?xml version="1.0" encoding="utf-8"?>
-<p:sld xmlns:a="http://schemas.openxmlformats.org/drawingml/2006/main" xmlns:r="http://schemas.openxmlformats.org/officeDocument/2006/relationships" xmlns:mc="http://schemas.openxmlformats.org/markup-compatibility/2006" xmlns:mv="urn:schemas-microsoft-com:mac:vml" xmlns:p="http://schemas.openxmlformats.org/presentationml/2006/main" xmlns:c="http://schemas.openxmlformats.org/drawingml/2006/chart" xmlns:dgm="http://schemas.openxmlformats.org/drawingml/2006/diagram" xmlns:o="urn:schemas-microsoft-com:office:office" xmlns:v="urn:schemas-microsoft-com:vml" xmlns:pvml="urn:schemas-microsoft-com:office:powerpoint" xmlns:com="http://schemas.openxmlformats.org/drawingml/2006/compatibility" xmlns:p14="http://schemas.microsoft.com/office/powerpoint/2010/main" xmlns:p15="http://schemas.microsoft.com/office/powerpoint/2012/main">
-  <p:cSld>
-    <p:spTree>
-      <p:nvGrpSpPr>
-        <p:cNvPr id="166" name="Shape 166"/>
-        <p:cNvGrpSpPr/>
-        <p:nvPr/>
-      </p:nvGrpSpPr>
-      <p:grpSpPr>
-        <a:xfrm>
-          <a:off x="0" y="0"/>
-          <a:ext cx="0" cy="0"/>
-          <a:chOff x="0" y="0"/>
-          <a:chExt cx="0" cy="0"/>
-        </a:xfrm>
-      </p:grpSpPr>
-      <p:sp>
-        <p:nvSpPr>
-          <p:cNvPr id="167" name="Google Shape;167;p18"/>
-          <p:cNvSpPr txBox="1"/>
-          <p:nvPr>
-            <p:ph type="title"/>
-          </p:nvPr>
-        </p:nvSpPr>
-        <p:spPr>
-          <a:xfrm>
-            <a:off x="1297500" y="393750"/>
-            <a:ext cx="7038900" cy="914100"/>
-          </a:xfrm>
-          <a:prstGeom prst="rect">
-            <a:avLst/>
-          </a:prstGeom>
-        </p:spPr>
-        <p:txBody>
-          <a:bodyPr anchorCtr="0" anchor="t" bIns="91425" lIns="91425" spcFirstLastPara="1" rIns="91425" wrap="square" tIns="91425">
-            <a:noAutofit/>
-          </a:bodyPr>
-          <a:lstStyle/>
-          <a:p>
-            <a:pPr indent="0" lvl="0" marL="0" rtl="0" algn="l">
-              <a:spcBef>
-                <a:spcPts val="0"/>
-              </a:spcBef>
-              <a:spcAft>
-                <a:spcPts val="0"/>
-              </a:spcAft>
-              <a:buNone/>
-            </a:pPr>
-            <a:r>
-              <a:rPr lang="en"/>
-              <a:t>Security</a:t>
-            </a:r>
-            <a:endParaRPr/>
-          </a:p>
-        </p:txBody>
-      </p:sp>
-      <p:sp>
-        <p:nvSpPr>
-          <p:cNvPr id="168" name="Google Shape;168;p18"/>
-          <p:cNvSpPr txBox="1"/>
-          <p:nvPr>
-            <p:ph idx="1" type="body"/>
-          </p:nvPr>
-        </p:nvSpPr>
-        <p:spPr>
-          <a:xfrm>
-            <a:off x="1297500" y="1567550"/>
-            <a:ext cx="7038900" cy="2911200"/>
-          </a:xfrm>
-          <a:prstGeom prst="rect">
-            <a:avLst/>
-          </a:prstGeom>
-        </p:spPr>
-        <p:txBody>
-          <a:bodyPr anchorCtr="0" anchor="t" bIns="91425" lIns="91425" spcFirstLastPara="1" rIns="91425" wrap="square" tIns="91425">
-            <a:noAutofit/>
-          </a:bodyPr>
-          <a:lstStyle/>
-          <a:p>
-            <a:pPr indent="0" lvl="0" marL="0" rtl="0" algn="l">
-              <a:spcBef>
-                <a:spcPts val="0"/>
-              </a:spcBef>
-              <a:spcAft>
-                <a:spcPts val="0"/>
-              </a:spcAft>
-              <a:buNone/>
-            </a:pPr>
-            <a:r>
-              <a:rPr lang="en"/>
-              <a:t>MassMine for the masses will implement the following security measures…</a:t>
-            </a:r>
-            <a:endParaRPr/>
-          </a:p>
-          <a:p>
-            <a:pPr indent="-311150" lvl="0" marL="457200" rtl="0" algn="l">
-              <a:spcBef>
-                <a:spcPts val="1600"/>
-              </a:spcBef>
-              <a:spcAft>
-                <a:spcPts val="0"/>
-              </a:spcAft>
-              <a:buSzPts val="1300"/>
-              <a:buChar char="●"/>
-            </a:pPr>
-            <a:r>
-              <a:rPr lang="en"/>
-              <a:t>At-rest encryption of user authorization keys, usernames, and Twitter data</a:t>
-            </a:r>
-            <a:endParaRPr/>
-          </a:p>
-          <a:p>
-            <a:pPr indent="-311150" lvl="0" marL="457200" rtl="0" algn="l">
-              <a:spcBef>
-                <a:spcPts val="0"/>
-              </a:spcBef>
-              <a:spcAft>
-                <a:spcPts val="0"/>
-              </a:spcAft>
-              <a:buSzPts val="1300"/>
-              <a:buChar char="●"/>
-            </a:pPr>
-            <a:r>
-              <a:rPr lang="en"/>
-              <a:t>Passwords will be salted and hashed</a:t>
-            </a:r>
-            <a:endParaRPr/>
-          </a:p>
-          <a:p>
-            <a:pPr indent="-311150" lvl="0" marL="457200" rtl="0" algn="l">
-              <a:spcBef>
-                <a:spcPts val="0"/>
-              </a:spcBef>
-              <a:spcAft>
-                <a:spcPts val="0"/>
-              </a:spcAft>
-              <a:buSzPts val="1300"/>
-              <a:buChar char="●"/>
-            </a:pPr>
-            <a:r>
-              <a:rPr lang="en"/>
-              <a:t>The site will be be accessed via an https page</a:t>
-            </a:r>
-            <a:endParaRPr/>
-          </a:p>
-          <a:p>
-            <a:pPr indent="-311150" lvl="0" marL="457200" rtl="0" algn="l">
-              <a:spcBef>
-                <a:spcPts val="0"/>
-              </a:spcBef>
-              <a:spcAft>
-                <a:spcPts val="0"/>
-              </a:spcAft>
-              <a:buSzPts val="1300"/>
-              <a:buChar char="●"/>
-            </a:pPr>
-            <a:r>
-              <a:rPr lang="en"/>
-              <a:t> Built-in security features within the Django framework used to prevent</a:t>
-            </a:r>
-            <a:endParaRPr/>
-          </a:p>
-          <a:p>
-            <a:pPr indent="-298450" lvl="1" marL="914400" rtl="0" algn="l">
-              <a:spcBef>
-                <a:spcPts val="0"/>
-              </a:spcBef>
-              <a:spcAft>
-                <a:spcPts val="0"/>
-              </a:spcAft>
-              <a:buSzPts val="1100"/>
-              <a:buChar char="○"/>
-            </a:pPr>
-            <a:r>
-              <a:rPr lang="en"/>
-              <a:t>Cross site scripting</a:t>
-            </a:r>
-            <a:endParaRPr/>
-          </a:p>
-          <a:p>
-            <a:pPr indent="-298450" lvl="1" marL="914400" rtl="0" algn="l">
-              <a:spcBef>
-                <a:spcPts val="0"/>
-              </a:spcBef>
-              <a:spcAft>
-                <a:spcPts val="0"/>
-              </a:spcAft>
-              <a:buSzPts val="1100"/>
-              <a:buChar char="○"/>
-            </a:pPr>
-            <a:r>
-              <a:rPr lang="en"/>
-              <a:t>Cross site request forgery  </a:t>
-            </a:r>
-            <a:endParaRPr/>
-          </a:p>
-          <a:p>
-            <a:pPr indent="-311150" lvl="0" marL="457200" rtl="0" algn="l">
-              <a:spcBef>
-                <a:spcPts val="0"/>
-              </a:spcBef>
-              <a:spcAft>
-                <a:spcPts val="0"/>
-              </a:spcAft>
-              <a:buSzPts val="1300"/>
-              <a:buChar char="●"/>
-            </a:pPr>
-            <a:r>
-              <a:rPr lang="en"/>
-              <a:t>Additional measures to prevent:</a:t>
-            </a:r>
-            <a:endParaRPr/>
-          </a:p>
-          <a:p>
-            <a:pPr indent="-298450" lvl="1" marL="914400" rtl="0" algn="l">
-              <a:spcBef>
-                <a:spcPts val="0"/>
-              </a:spcBef>
-              <a:spcAft>
-                <a:spcPts val="0"/>
-              </a:spcAft>
-              <a:buSzPts val="1100"/>
-              <a:buChar char="○"/>
-            </a:pPr>
-            <a:r>
-              <a:rPr lang="en"/>
-              <a:t>Injection attacks (input validation)</a:t>
-            </a:r>
-            <a:endParaRPr/>
-          </a:p>
-        </p:txBody>
-      </p:sp>
-    </p:spTree>
-  </p:cSld>
-  <p:clrMapOvr>
-    <a:masterClrMapping/>
-  </p:clrMapOvr>
-</p:sld>
-</file>
-
-<file path=ppt/slides/slide7.xml><?xml version="1.0" encoding="utf-8"?>
-<p:sld xmlns:a="http://schemas.openxmlformats.org/drawingml/2006/main" xmlns:r="http://schemas.openxmlformats.org/officeDocument/2006/relationships" xmlns:mc="http://schemas.openxmlformats.org/markup-compatibility/2006" xmlns:mv="urn:schemas-microsoft-com:mac:vml" xmlns:p="http://schemas.openxmlformats.org/presentationml/2006/main" xmlns:c="http://schemas.openxmlformats.org/drawingml/2006/chart" xmlns:dgm="http://schemas.openxmlformats.org/drawingml/2006/diagram" xmlns:o="urn:schemas-microsoft-com:office:office" xmlns:v="urn:schemas-microsoft-com:vml" xmlns:pvml="urn:schemas-microsoft-com:office:powerpoint" xmlns:com="http://schemas.openxmlformats.org/drawingml/2006/compatibility" xmlns:p14="http://schemas.microsoft.com/office/powerpoint/2010/main" xmlns:p15="http://schemas.microsoft.com/office/powerpoint/2012/main">
-  <p:cSld>
-    <p:spTree>
-      <p:nvGrpSpPr>
-        <p:cNvPr id="172" name="Shape 172"/>
-        <p:cNvGrpSpPr/>
-        <p:nvPr/>
-      </p:nvGrpSpPr>
-      <p:grpSpPr>
-        <a:xfrm>
-          <a:off x="0" y="0"/>
-          <a:ext cx="0" cy="0"/>
-          <a:chOff x="0" y="0"/>
-          <a:chExt cx="0" cy="0"/>
-        </a:xfrm>
-      </p:grpSpPr>
-      <p:sp>
-        <p:nvSpPr>
-          <p:cNvPr id="173" name="Google Shape;173;p19"/>
-          <p:cNvSpPr txBox="1"/>
-          <p:nvPr>
-            <p:ph type="title"/>
-          </p:nvPr>
-        </p:nvSpPr>
-        <p:spPr>
-          <a:xfrm>
-            <a:off x="1297500" y="393750"/>
-            <a:ext cx="7038900" cy="914100"/>
-          </a:xfrm>
-          <a:prstGeom prst="rect">
-            <a:avLst/>
-          </a:prstGeom>
-        </p:spPr>
-        <p:txBody>
-          <a:bodyPr anchorCtr="0" anchor="t" bIns="91425" lIns="91425" spcFirstLastPara="1" rIns="91425" wrap="square" tIns="91425">
-            <a:noAutofit/>
-          </a:bodyPr>
-          <a:lstStyle/>
-          <a:p>
-            <a:pPr indent="0" lvl="0" marL="0" rtl="0" algn="l">
-              <a:spcBef>
-                <a:spcPts val="0"/>
-              </a:spcBef>
-              <a:spcAft>
-                <a:spcPts val="0"/>
-              </a:spcAft>
-              <a:buNone/>
-            </a:pPr>
-            <a:r>
-              <a:rPr lang="en"/>
-              <a:t>Challenges: The Tweet Object</a:t>
-            </a:r>
-            <a:endParaRPr/>
-          </a:p>
-        </p:txBody>
-      </p:sp>
-      <p:sp>
-        <p:nvSpPr>
-          <p:cNvPr id="174" name="Google Shape;174;p19"/>
-          <p:cNvSpPr txBox="1"/>
-          <p:nvPr>
-            <p:ph idx="1" type="body"/>
-          </p:nvPr>
-        </p:nvSpPr>
-        <p:spPr>
-          <a:xfrm>
-            <a:off x="1052550" y="1251400"/>
-            <a:ext cx="2080800" cy="2967600"/>
-          </a:xfrm>
-          <a:prstGeom prst="rect">
-            <a:avLst/>
-          </a:prstGeom>
-        </p:spPr>
-        <p:txBody>
-          <a:bodyPr anchorCtr="0" anchor="t" bIns="91425" lIns="91425" spcFirstLastPara="1" rIns="91425" wrap="square" tIns="91425">
-            <a:noAutofit/>
-          </a:bodyPr>
-          <a:lstStyle/>
-          <a:p>
-            <a:pPr indent="0" lvl="0" marL="0" rtl="0" algn="l">
-              <a:spcBef>
-                <a:spcPts val="0"/>
-              </a:spcBef>
-              <a:spcAft>
-                <a:spcPts val="1600"/>
-              </a:spcAft>
-              <a:buNone/>
-            </a:pPr>
-            <a:r>
-              <a:rPr lang="en"/>
-              <a:t>Contains around 50 fields:</a:t>
-            </a:r>
-            <a:br>
-              <a:rPr lang="en"/>
-            </a:br>
-            <a:endParaRPr/>
-          </a:p>
-        </p:txBody>
-      </p:sp>
-      <p:pic>
-        <p:nvPicPr>
-          <p:cNvPr id="175" name="Google Shape;175;p19"/>
-          <p:cNvPicPr preferRelativeResize="0"/>
-          <p:nvPr/>
-        </p:nvPicPr>
-        <p:blipFill>
-          <a:blip r:embed="rId3">
-            <a:alphaModFix/>
-          </a:blip>
-          <a:stretch>
-            <a:fillRect/>
-          </a:stretch>
-        </p:blipFill>
-        <p:spPr>
-          <a:xfrm>
-            <a:off x="3867275" y="1307850"/>
-            <a:ext cx="4578540" cy="3530850"/>
-          </a:xfrm>
-          <a:prstGeom prst="rect">
-            <a:avLst/>
-          </a:prstGeom>
-          <a:noFill/>
-          <a:ln>
-            <a:noFill/>
-          </a:ln>
-        </p:spPr>
-      </p:pic>
-    </p:spTree>
-  </p:cSld>
-  <p:clrMapOvr>
-    <a:masterClrMapping/>
-  </p:clrMapOvr>
-</p:sld>
-</file>
-
-<file path=ppt/slides/slide8.xml><?xml version="1.0" encoding="utf-8"?>
-<p:sld xmlns:a="http://schemas.openxmlformats.org/drawingml/2006/main" xmlns:r="http://schemas.openxmlformats.org/officeDocument/2006/relationships" xmlns:mc="http://schemas.openxmlformats.org/markup-compatibility/2006" xmlns:mv="urn:schemas-microsoft-com:mac:vml" xmlns:p="http://schemas.openxmlformats.org/presentationml/2006/main" xmlns:c="http://schemas.openxmlformats.org/drawingml/2006/chart" xmlns:dgm="http://schemas.openxmlformats.org/drawingml/2006/diagram" xmlns:o="urn:schemas-microsoft-com:office:office" xmlns:v="urn:schemas-microsoft-com:vml" xmlns:pvml="urn:schemas-microsoft-com:office:powerpoint" xmlns:com="http://schemas.openxmlformats.org/drawingml/2006/compatibility" xmlns:p14="http://schemas.microsoft.com/office/powerpoint/2010/main" xmlns:p15="http://schemas.microsoft.com/office/powerpoint/2012/main">
-  <p:cSld>
-    <p:spTree>
-      <p:nvGrpSpPr>
-        <p:cNvPr id="179" name="Shape 179"/>
-        <p:cNvGrpSpPr/>
-        <p:nvPr/>
-      </p:nvGrpSpPr>
-      <p:grpSpPr>
-        <a:xfrm>
-          <a:off x="0" y="0"/>
-          <a:ext cx="0" cy="0"/>
-          <a:chOff x="0" y="0"/>
-          <a:chExt cx="0" cy="0"/>
-        </a:xfrm>
-      </p:grpSpPr>
-      <p:sp>
-        <p:nvSpPr>
-          <p:cNvPr id="180" name="Google Shape;180;p20"/>
-          <p:cNvSpPr txBox="1"/>
-          <p:nvPr>
-            <p:ph type="title"/>
-          </p:nvPr>
-        </p:nvSpPr>
-        <p:spPr>
-          <a:xfrm>
-            <a:off x="1173900" y="400975"/>
-            <a:ext cx="7038900" cy="914100"/>
-          </a:xfrm>
-          <a:prstGeom prst="rect">
-            <a:avLst/>
-          </a:prstGeom>
-        </p:spPr>
-        <p:txBody>
-          <a:bodyPr anchorCtr="0" anchor="t" bIns="91425" lIns="91425" spcFirstLastPara="1" rIns="91425" wrap="square" tIns="91425">
-            <a:noAutofit/>
-          </a:bodyPr>
-          <a:lstStyle/>
-          <a:p>
-            <a:pPr indent="0" lvl="0" marL="0" rtl="0" algn="l">
-              <a:spcBef>
-                <a:spcPts val="0"/>
-              </a:spcBef>
-              <a:spcAft>
-                <a:spcPts val="0"/>
-              </a:spcAft>
-              <a:buNone/>
-            </a:pPr>
-            <a:r>
-              <a:rPr lang="en"/>
-              <a:t>Scrum Update: Feb 5</a:t>
-            </a:r>
-            <a:endParaRPr/>
-          </a:p>
-        </p:txBody>
-      </p:sp>
-      <p:sp>
-        <p:nvSpPr>
-          <p:cNvPr id="181" name="Google Shape;181;p20"/>
-          <p:cNvSpPr txBox="1"/>
-          <p:nvPr>
-            <p:ph idx="1" type="body"/>
-          </p:nvPr>
-        </p:nvSpPr>
-        <p:spPr>
-          <a:xfrm>
-            <a:off x="5900138" y="3361950"/>
-            <a:ext cx="2299200" cy="2911200"/>
-          </a:xfrm>
-          <a:prstGeom prst="rect">
-            <a:avLst/>
-          </a:prstGeom>
-        </p:spPr>
-        <p:txBody>
-          <a:bodyPr anchorCtr="0" anchor="t" bIns="91425" lIns="91425" spcFirstLastPara="1" rIns="91425" wrap="square" tIns="91425">
-            <a:noAutofit/>
-          </a:bodyPr>
-          <a:lstStyle/>
-          <a:p>
-            <a:pPr indent="0" lvl="0" marL="0" rtl="0" algn="l">
-              <a:spcBef>
-                <a:spcPts val="0"/>
-              </a:spcBef>
-              <a:spcAft>
-                <a:spcPts val="1600"/>
-              </a:spcAft>
-              <a:buNone/>
-            </a:pPr>
-            <a:r>
-              <a:rPr lang="en"/>
-              <a:t>Sprint past week: On target!</a:t>
-            </a:r>
-            <a:endParaRPr/>
-          </a:p>
-        </p:txBody>
-      </p:sp>
-      <p:pic>
-        <p:nvPicPr>
-          <p:cNvPr id="182" name="Google Shape;182;p20"/>
-          <p:cNvPicPr preferRelativeResize="0"/>
-          <p:nvPr/>
-        </p:nvPicPr>
-        <p:blipFill>
-          <a:blip r:embed="rId3">
-            <a:alphaModFix/>
-          </a:blip>
-          <a:stretch>
-            <a:fillRect/>
-          </a:stretch>
-        </p:blipFill>
-        <p:spPr>
-          <a:xfrm>
-            <a:off x="583875" y="1238625"/>
-            <a:ext cx="4850650" cy="3407224"/>
-          </a:xfrm>
-          <a:prstGeom prst="rect">
-            <a:avLst/>
-          </a:prstGeom>
-          <a:noFill/>
-          <a:ln>
-            <a:noFill/>
-          </a:ln>
-        </p:spPr>
-      </p:pic>
-      <p:pic>
-        <p:nvPicPr>
-          <p:cNvPr id="183" name="Google Shape;183;p20"/>
-          <p:cNvPicPr preferRelativeResize="0"/>
-          <p:nvPr/>
-        </p:nvPicPr>
-        <p:blipFill>
-          <a:blip r:embed="rId4">
-            <a:alphaModFix/>
-          </a:blip>
-          <a:stretch>
-            <a:fillRect/>
-          </a:stretch>
-        </p:blipFill>
-        <p:spPr>
-          <a:xfrm>
-            <a:off x="4569575" y="780500"/>
-            <a:ext cx="4286249" cy="2128150"/>
-          </a:xfrm>
-          <a:prstGeom prst="rect">
-            <a:avLst/>
-          </a:prstGeom>
-          <a:noFill/>
-          <a:ln>
-            <a:noFill/>
-          </a:ln>
-        </p:spPr>
-      </p:pic>
-    </p:spTree>
-  </p:cSld>
-  <p:clrMapOvr>
-    <a:masterClrMapping/>
-  </p:clrMapOvr>
-</p:sld>
-</file>
-
-<file path=ppt/slides/slide9.xml><?xml version="1.0" encoding="utf-8"?>
-<p:sld xmlns:a="http://schemas.openxmlformats.org/drawingml/2006/main" xmlns:r="http://schemas.openxmlformats.org/officeDocument/2006/relationships" xmlns:mc="http://schemas.openxmlformats.org/markup-compatibility/2006" xmlns:mv="urn:schemas-microsoft-com:mac:vml" xmlns:p="http://schemas.openxmlformats.org/presentationml/2006/main" xmlns:c="http://schemas.openxmlformats.org/drawingml/2006/chart" xmlns:dgm="http://schemas.openxmlformats.org/drawingml/2006/diagram" xmlns:o="urn:schemas-microsoft-com:office:office" xmlns:v="urn:schemas-microsoft-com:vml" xmlns:pvml="urn:schemas-microsoft-com:office:powerpoint" xmlns:com="http://schemas.openxmlformats.org/drawingml/2006/compatibility" xmlns:p14="http://schemas.microsoft.com/office/powerpoint/2010/main" xmlns:p15="http://schemas.microsoft.com/office/powerpoint/2012/main">
-  <p:cSld>
-    <p:spTree>
-      <p:nvGrpSpPr>
-        <p:cNvPr id="187" name="Shape 187"/>
-        <p:cNvGrpSpPr/>
-        <p:nvPr/>
-      </p:nvGrpSpPr>
-      <p:grpSpPr>
-        <a:xfrm>
-          <a:off x="0" y="0"/>
-          <a:ext cx="0" cy="0"/>
-          <a:chOff x="0" y="0"/>
-          <a:chExt cx="0" cy="0"/>
-        </a:xfrm>
-      </p:grpSpPr>
-      <p:sp>
-        <p:nvSpPr>
-          <p:cNvPr id="188" name="Google Shape;188;p21"/>
-          <p:cNvSpPr txBox="1"/>
-          <p:nvPr>
-            <p:ph type="title"/>
-          </p:nvPr>
-        </p:nvSpPr>
-        <p:spPr>
-          <a:xfrm>
-            <a:off x="1115900" y="362900"/>
-            <a:ext cx="7038900" cy="914100"/>
-          </a:xfrm>
-          <a:prstGeom prst="rect">
-            <a:avLst/>
-          </a:prstGeom>
-        </p:spPr>
-        <p:txBody>
-          <a:bodyPr anchorCtr="0" anchor="t" bIns="91425" lIns="91425" spcFirstLastPara="1" rIns="91425" wrap="square" tIns="91425">
-            <a:noAutofit/>
-          </a:bodyPr>
-          <a:lstStyle/>
-          <a:p>
-            <a:pPr indent="0" lvl="0" marL="0" rtl="0" algn="l">
-              <a:spcBef>
-                <a:spcPts val="0"/>
-              </a:spcBef>
-              <a:spcAft>
-                <a:spcPts val="0"/>
-              </a:spcAft>
-              <a:buNone/>
-            </a:pPr>
-            <a:r>
-              <a:rPr lang="en"/>
-              <a:t>Backlog: Feb. 05</a:t>
-            </a:r>
-            <a:endParaRPr/>
-          </a:p>
-        </p:txBody>
-      </p:sp>
-      <p:sp>
-        <p:nvSpPr>
-          <p:cNvPr id="189" name="Google Shape;189;p21"/>
-          <p:cNvSpPr txBox="1"/>
-          <p:nvPr>
-            <p:ph idx="1" type="body"/>
-          </p:nvPr>
-        </p:nvSpPr>
-        <p:spPr>
-          <a:xfrm>
-            <a:off x="1300425" y="3799500"/>
-            <a:ext cx="2648100" cy="537600"/>
-          </a:xfrm>
-          <a:prstGeom prst="rect">
-            <a:avLst/>
-          </a:prstGeom>
-        </p:spPr>
-        <p:txBody>
-          <a:bodyPr anchorCtr="0" anchor="t" bIns="91425" lIns="91425" spcFirstLastPara="1" rIns="91425" wrap="square" tIns="91425">
-            <a:noAutofit/>
-          </a:bodyPr>
-          <a:lstStyle/>
-          <a:p>
-            <a:pPr indent="0" lvl="0" marL="0" rtl="0" algn="l">
-              <a:spcBef>
-                <a:spcPts val="0"/>
-              </a:spcBef>
-              <a:spcAft>
-                <a:spcPts val="1600"/>
-              </a:spcAft>
-              <a:buNone/>
-            </a:pPr>
-            <a:r>
-              <a:rPr lang="en"/>
-              <a:t>We have a lot to do...</a:t>
-            </a:r>
-            <a:endParaRPr/>
-          </a:p>
-        </p:txBody>
-      </p:sp>
-      <p:pic>
-        <p:nvPicPr>
-          <p:cNvPr id="190" name="Google Shape;190;p21"/>
-          <p:cNvPicPr preferRelativeResize="0"/>
-          <p:nvPr/>
-        </p:nvPicPr>
-        <p:blipFill>
-          <a:blip r:embed="rId3">
-            <a:alphaModFix/>
-          </a:blip>
-          <a:stretch>
-            <a:fillRect/>
-          </a:stretch>
-        </p:blipFill>
-        <p:spPr>
-          <a:xfrm>
-            <a:off x="4667625" y="1807575"/>
-            <a:ext cx="3705150" cy="2972800"/>
-          </a:xfrm>
-          <a:prstGeom prst="rect">
-            <a:avLst/>
-          </a:prstGeom>
-          <a:noFill/>
-          <a:ln>
-            <a:noFill/>
-          </a:ln>
-        </p:spPr>
-      </p:pic>
-      <p:pic>
-        <p:nvPicPr>
-          <p:cNvPr id="191" name="Google Shape;191;p21"/>
-          <p:cNvPicPr preferRelativeResize="0"/>
-          <p:nvPr/>
-        </p:nvPicPr>
-        <p:blipFill>
-          <a:blip r:embed="rId4">
-            <a:alphaModFix/>
-          </a:blip>
-          <a:stretch>
-            <a:fillRect/>
-          </a:stretch>
-        </p:blipFill>
-        <p:spPr>
-          <a:xfrm>
-            <a:off x="1065050" y="1099025"/>
-            <a:ext cx="4959300" cy="2111275"/>
+            <a:off x="979425" y="796725"/>
+            <a:ext cx="5749675" cy="3930150"/>
           </a:xfrm>
           <a:prstGeom prst="rect">
             <a:avLst/>

</xml_diff>